<commit_message>
Minor Change Desain Penelitian
</commit_message>
<xml_diff>
--- a/Resource/Skripsi/Desain Penelitian.pptx
+++ b/Resource/Skripsi/Desain Penelitian.pptx
@@ -5175,16 +5175,1726 @@
           <a:chExt cx="0" cy="0"/>
         </a:xfrm>
       </p:grpSpPr>
-      <p:sp>
-        <p:nvSpPr>
-          <p:cNvPr id="4" name="Rectangle 3"/>
+      <p:grpSp>
+        <p:nvGrpSpPr>
+          <p:cNvPr id="58" name="Group 57"/>
+          <p:cNvGrpSpPr/>
+          <p:nvPr/>
+        </p:nvGrpSpPr>
+        <p:grpSpPr>
+          <a:xfrm>
+            <a:off x="2559906" y="-583025"/>
+            <a:ext cx="2580404" cy="1339142"/>
+            <a:chOff x="0" y="1"/>
+            <a:chExt cx="2580404" cy="1339142"/>
+          </a:xfrm>
+        </p:grpSpPr>
+        <p:sp>
+          <p:nvSpPr>
+            <p:cNvPr id="4" name="Rectangle 3"/>
+            <p:cNvSpPr/>
+            <p:nvPr/>
+          </p:nvSpPr>
+          <p:spPr>
+            <a:xfrm>
+              <a:off x="0" y="1"/>
+              <a:ext cx="2580404" cy="1339142"/>
+            </a:xfrm>
+            <a:prstGeom prst="rect">
+              <a:avLst/>
+            </a:prstGeom>
+            <a:noFill/>
+            <a:ln>
+              <a:solidFill>
+                <a:schemeClr val="tx1"/>
+              </a:solidFill>
+            </a:ln>
+          </p:spPr>
+          <p:style>
+            <a:lnRef idx="2">
+              <a:schemeClr val="accent1">
+                <a:shade val="50000"/>
+              </a:schemeClr>
+            </a:lnRef>
+            <a:fillRef idx="1">
+              <a:schemeClr val="accent1"/>
+            </a:fillRef>
+            <a:effectRef idx="0">
+              <a:schemeClr val="accent1"/>
+            </a:effectRef>
+            <a:fontRef idx="minor">
+              <a:schemeClr val="lt1"/>
+            </a:fontRef>
+          </p:style>
+          <p:txBody>
+            <a:bodyPr rtlCol="0" anchor="ctr"/>
+            <a:lstStyle/>
+            <a:p>
+              <a:pPr algn="ctr"/>
+              <a:endParaRPr lang="id-ID" sz="1200">
+                <a:latin typeface="Times New Roman" panose="02020603050405020304" pitchFamily="18" charset="0"/>
+                <a:cs typeface="Times New Roman" panose="02020603050405020304" pitchFamily="18" charset="0"/>
+              </a:endParaRPr>
+            </a:p>
+          </p:txBody>
+        </p:sp>
+        <p:sp>
+          <p:nvSpPr>
+            <p:cNvPr id="5" name="TextBox 4"/>
+            <p:cNvSpPr txBox="1"/>
+            <p:nvPr/>
+          </p:nvSpPr>
+          <p:spPr>
+            <a:xfrm>
+              <a:off x="159924" y="203408"/>
+              <a:ext cx="2260555" cy="1092607"/>
+            </a:xfrm>
+            <a:prstGeom prst="rect">
+              <a:avLst/>
+            </a:prstGeom>
+            <a:noFill/>
+          </p:spPr>
+          <p:txBody>
+            <a:bodyPr wrap="none" rtlCol="0">
+              <a:spAutoFit/>
+            </a:bodyPr>
+            <a:lstStyle/>
+            <a:p>
+              <a:pPr>
+                <a:spcAft>
+                  <a:spcPts val="600"/>
+                </a:spcAft>
+              </a:pPr>
+              <a:r>
+                <a:rPr lang="id-ID" sz="1200" dirty="0" smtClean="0">
+                  <a:latin typeface="Times New Roman" panose="02020603050405020304" pitchFamily="18" charset="0"/>
+                  <a:cs typeface="Times New Roman" panose="02020603050405020304" pitchFamily="18" charset="0"/>
+                </a:rPr>
+                <a:t>Tahap Persiapan:</a:t>
+              </a:r>
+            </a:p>
+            <a:p>
+              <a:pPr marL="228600" indent="-228600">
+                <a:buAutoNum type="arabicPeriod"/>
+              </a:pPr>
+              <a:r>
+                <a:rPr lang="id-ID" sz="1200" dirty="0" smtClean="0">
+                  <a:latin typeface="Times New Roman" panose="02020603050405020304" pitchFamily="18" charset="0"/>
+                  <a:cs typeface="Times New Roman" panose="02020603050405020304" pitchFamily="18" charset="0"/>
+                </a:rPr>
+                <a:t>Identifikasi masalah</a:t>
+              </a:r>
+            </a:p>
+            <a:p>
+              <a:pPr marL="228600" indent="-228600">
+                <a:buAutoNum type="arabicPeriod"/>
+              </a:pPr>
+              <a:r>
+                <a:rPr lang="id-ID" sz="1200" dirty="0" smtClean="0">
+                  <a:latin typeface="Times New Roman" panose="02020603050405020304" pitchFamily="18" charset="0"/>
+                  <a:cs typeface="Times New Roman" panose="02020603050405020304" pitchFamily="18" charset="0"/>
+                </a:rPr>
+                <a:t>Merumuskan masalah</a:t>
+              </a:r>
+            </a:p>
+            <a:p>
+              <a:pPr marL="228600" indent="-228600">
+                <a:buAutoNum type="arabicPeriod"/>
+              </a:pPr>
+              <a:r>
+                <a:rPr lang="id-ID" sz="1200" dirty="0" smtClean="0">
+                  <a:latin typeface="Times New Roman" panose="02020603050405020304" pitchFamily="18" charset="0"/>
+                  <a:cs typeface="Times New Roman" panose="02020603050405020304" pitchFamily="18" charset="0"/>
+                </a:rPr>
+                <a:t>Menentukan </a:t>
+              </a:r>
+              <a:r>
+                <a:rPr lang="en-ID" sz="1200" dirty="0" err="1" smtClean="0">
+                  <a:latin typeface="Times New Roman" panose="02020603050405020304" pitchFamily="18" charset="0"/>
+                  <a:cs typeface="Times New Roman" panose="02020603050405020304" pitchFamily="18" charset="0"/>
+                </a:rPr>
+                <a:t>metode</a:t>
+              </a:r>
+              <a:endParaRPr lang="id-ID" sz="1200" dirty="0" smtClean="0">
+                <a:latin typeface="Times New Roman" panose="02020603050405020304" pitchFamily="18" charset="0"/>
+                <a:cs typeface="Times New Roman" panose="02020603050405020304" pitchFamily="18" charset="0"/>
+              </a:endParaRPr>
+            </a:p>
+            <a:p>
+              <a:pPr marL="228600" indent="-228600">
+                <a:buAutoNum type="arabicPeriod"/>
+              </a:pPr>
+              <a:r>
+                <a:rPr lang="id-ID" sz="1200" dirty="0" smtClean="0">
+                  <a:latin typeface="Times New Roman" panose="02020603050405020304" pitchFamily="18" charset="0"/>
+                  <a:cs typeface="Times New Roman" panose="02020603050405020304" pitchFamily="18" charset="0"/>
+                </a:rPr>
+                <a:t>Menentukan model penelitian</a:t>
+              </a:r>
+              <a:endParaRPr lang="id-ID" sz="1200" dirty="0">
+                <a:latin typeface="Times New Roman" panose="02020603050405020304" pitchFamily="18" charset="0"/>
+                <a:cs typeface="Times New Roman" panose="02020603050405020304" pitchFamily="18" charset="0"/>
+              </a:endParaRPr>
+            </a:p>
+          </p:txBody>
+        </p:sp>
+      </p:grpSp>
+      <p:grpSp>
+        <p:nvGrpSpPr>
+          <p:cNvPr id="57" name="Group 56"/>
+          <p:cNvGrpSpPr/>
+          <p:nvPr/>
+        </p:nvGrpSpPr>
+        <p:grpSpPr>
+          <a:xfrm>
+            <a:off x="5398744" y="-379618"/>
+            <a:ext cx="2580404" cy="2508146"/>
+            <a:chOff x="0" y="1601753"/>
+            <a:chExt cx="2580404" cy="2508146"/>
+          </a:xfrm>
+        </p:grpSpPr>
+        <p:sp>
+          <p:nvSpPr>
+            <p:cNvPr id="6" name="Rectangle 5"/>
+            <p:cNvSpPr/>
+            <p:nvPr/>
+          </p:nvSpPr>
+          <p:spPr>
+            <a:xfrm>
+              <a:off x="0" y="1601753"/>
+              <a:ext cx="2580404" cy="2508146"/>
+            </a:xfrm>
+            <a:prstGeom prst="rect">
+              <a:avLst/>
+            </a:prstGeom>
+            <a:noFill/>
+            <a:ln>
+              <a:solidFill>
+                <a:schemeClr val="tx1"/>
+              </a:solidFill>
+            </a:ln>
+          </p:spPr>
+          <p:style>
+            <a:lnRef idx="2">
+              <a:schemeClr val="accent1">
+                <a:shade val="50000"/>
+              </a:schemeClr>
+            </a:lnRef>
+            <a:fillRef idx="1">
+              <a:schemeClr val="accent1"/>
+            </a:fillRef>
+            <a:effectRef idx="0">
+              <a:schemeClr val="accent1"/>
+            </a:effectRef>
+            <a:fontRef idx="minor">
+              <a:schemeClr val="lt1"/>
+            </a:fontRef>
+          </p:style>
+          <p:txBody>
+            <a:bodyPr rtlCol="0" anchor="ctr"/>
+            <a:lstStyle/>
+            <a:p>
+              <a:pPr algn="ctr"/>
+              <a:endParaRPr lang="id-ID" sz="1200">
+                <a:latin typeface="Times New Roman" panose="02020603050405020304" pitchFamily="18" charset="0"/>
+                <a:cs typeface="Times New Roman" panose="02020603050405020304" pitchFamily="18" charset="0"/>
+              </a:endParaRPr>
+            </a:p>
+          </p:txBody>
+        </p:sp>
+        <p:sp>
+          <p:nvSpPr>
+            <p:cNvPr id="7" name="TextBox 6"/>
+            <p:cNvSpPr txBox="1"/>
+            <p:nvPr/>
+          </p:nvSpPr>
+          <p:spPr>
+            <a:xfrm>
+              <a:off x="188744" y="1953617"/>
+              <a:ext cx="2239267" cy="1831271"/>
+            </a:xfrm>
+            <a:prstGeom prst="rect">
+              <a:avLst/>
+            </a:prstGeom>
+            <a:noFill/>
+          </p:spPr>
+          <p:txBody>
+            <a:bodyPr wrap="none" rtlCol="0">
+              <a:spAutoFit/>
+            </a:bodyPr>
+            <a:lstStyle/>
+            <a:p>
+              <a:pPr>
+                <a:spcAft>
+                  <a:spcPts val="600"/>
+                </a:spcAft>
+              </a:pPr>
+              <a:r>
+                <a:rPr lang="id-ID" sz="1200" dirty="0" smtClean="0">
+                  <a:latin typeface="Times New Roman" panose="02020603050405020304" pitchFamily="18" charset="0"/>
+                  <a:cs typeface="Times New Roman" panose="02020603050405020304" pitchFamily="18" charset="0"/>
+                </a:rPr>
+                <a:t>Studi Literatur</a:t>
+              </a:r>
+            </a:p>
+            <a:p>
+              <a:pPr marL="228600" indent="-228600">
+                <a:buAutoNum type="arabicPeriod"/>
+              </a:pPr>
+              <a:r>
+                <a:rPr lang="id-ID" sz="1200" dirty="0" smtClean="0">
+                  <a:latin typeface="Times New Roman" panose="02020603050405020304" pitchFamily="18" charset="0"/>
+                  <a:cs typeface="Times New Roman" panose="02020603050405020304" pitchFamily="18" charset="0"/>
+                </a:rPr>
+                <a:t>Natural Language Processing</a:t>
+              </a:r>
+            </a:p>
+            <a:p>
+              <a:pPr marL="228600" indent="-228600">
+                <a:buAutoNum type="arabicPeriod"/>
+              </a:pPr>
+              <a:r>
+                <a:rPr lang="id-ID" sz="1200" dirty="0" smtClean="0">
+                  <a:latin typeface="Times New Roman" panose="02020603050405020304" pitchFamily="18" charset="0"/>
+                  <a:cs typeface="Times New Roman" panose="02020603050405020304" pitchFamily="18" charset="0"/>
+                </a:rPr>
+                <a:t>Data-to-Text</a:t>
+              </a:r>
+              <a:endParaRPr lang="en-ID" sz="1200" dirty="0" smtClean="0">
+                <a:latin typeface="Times New Roman" panose="02020603050405020304" pitchFamily="18" charset="0"/>
+                <a:cs typeface="Times New Roman" panose="02020603050405020304" pitchFamily="18" charset="0"/>
+              </a:endParaRPr>
+            </a:p>
+            <a:p>
+              <a:pPr marL="228600" indent="-228600">
+                <a:buAutoNum type="arabicPeriod"/>
+              </a:pPr>
+              <a:r>
+                <a:rPr lang="en-ID" sz="1200" dirty="0" smtClean="0">
+                  <a:latin typeface="Times New Roman" panose="02020603050405020304" pitchFamily="18" charset="0"/>
+                  <a:cs typeface="Times New Roman" panose="02020603050405020304" pitchFamily="18" charset="0"/>
+                </a:rPr>
+                <a:t>Statistical Analysis</a:t>
+              </a:r>
+            </a:p>
+            <a:p>
+              <a:pPr marL="228600" indent="-228600">
+                <a:buFontTx/>
+                <a:buAutoNum type="arabicPeriod"/>
+              </a:pPr>
+              <a:r>
+                <a:rPr lang="en-ID" sz="1200" dirty="0">
+                  <a:latin typeface="Times New Roman" panose="02020603050405020304" pitchFamily="18" charset="0"/>
+                  <a:cs typeface="Times New Roman" panose="02020603050405020304" pitchFamily="18" charset="0"/>
+                </a:rPr>
+                <a:t>Time Series </a:t>
+              </a:r>
+              <a:r>
+                <a:rPr lang="en-ID" sz="1200" dirty="0" smtClean="0">
+                  <a:latin typeface="Times New Roman" panose="02020603050405020304" pitchFamily="18" charset="0"/>
+                  <a:cs typeface="Times New Roman" panose="02020603050405020304" pitchFamily="18" charset="0"/>
+                </a:rPr>
+                <a:t>Analysis</a:t>
+              </a:r>
+            </a:p>
+            <a:p>
+              <a:pPr marL="228600" indent="-228600">
+                <a:buFontTx/>
+                <a:buAutoNum type="arabicPeriod"/>
+              </a:pPr>
+              <a:r>
+                <a:rPr lang="en-ID" sz="1200" dirty="0" smtClean="0">
+                  <a:latin typeface="Times New Roman" panose="02020603050405020304" pitchFamily="18" charset="0"/>
+                  <a:cs typeface="Times New Roman" panose="02020603050405020304" pitchFamily="18" charset="0"/>
+                </a:rPr>
+                <a:t>Exponential Smoothing</a:t>
+              </a:r>
+            </a:p>
+            <a:p>
+              <a:pPr marL="228600" indent="-228600">
+                <a:buFontTx/>
+                <a:buAutoNum type="arabicPeriod"/>
+              </a:pPr>
+              <a:r>
+                <a:rPr lang="en-ID" sz="1200" dirty="0" err="1" smtClean="0">
+                  <a:latin typeface="Times New Roman" panose="02020603050405020304" pitchFamily="18" charset="0"/>
+                  <a:cs typeface="Times New Roman" panose="02020603050405020304" pitchFamily="18" charset="0"/>
+                </a:rPr>
+                <a:t>Knutt</a:t>
+              </a:r>
+              <a:r>
+                <a:rPr lang="en-ID" sz="1200" dirty="0" smtClean="0">
+                  <a:latin typeface="Times New Roman" panose="02020603050405020304" pitchFamily="18" charset="0"/>
+                  <a:cs typeface="Times New Roman" panose="02020603050405020304" pitchFamily="18" charset="0"/>
+                </a:rPr>
+                <a:t>-Morris Pratt Algorithm</a:t>
+              </a:r>
+              <a:endParaRPr lang="id-ID" sz="1200" dirty="0">
+                <a:latin typeface="Times New Roman" panose="02020603050405020304" pitchFamily="18" charset="0"/>
+                <a:cs typeface="Times New Roman" panose="02020603050405020304" pitchFamily="18" charset="0"/>
+              </a:endParaRPr>
+            </a:p>
+            <a:p>
+              <a:pPr marL="228600" indent="-228600">
+                <a:buAutoNum type="arabicPeriod"/>
+              </a:pPr>
+              <a:r>
+                <a:rPr lang="id-ID" sz="1200" dirty="0" smtClean="0">
+                  <a:latin typeface="Times New Roman" panose="02020603050405020304" pitchFamily="18" charset="0"/>
+                  <a:cs typeface="Times New Roman" panose="02020603050405020304" pitchFamily="18" charset="0"/>
+                </a:rPr>
+                <a:t>Machine Learning</a:t>
+              </a:r>
+            </a:p>
+            <a:p>
+              <a:pPr marL="228600" indent="-228600">
+                <a:buAutoNum type="arabicPeriod"/>
+              </a:pPr>
+              <a:r>
+                <a:rPr lang="en-ID" sz="1200" dirty="0" smtClean="0">
+                  <a:latin typeface="Times New Roman" panose="02020603050405020304" pitchFamily="18" charset="0"/>
+                  <a:cs typeface="Times New Roman" panose="02020603050405020304" pitchFamily="18" charset="0"/>
+                </a:rPr>
+                <a:t>R Programming</a:t>
+              </a:r>
+              <a:endParaRPr lang="id-ID" sz="1200" dirty="0">
+                <a:latin typeface="Times New Roman" panose="02020603050405020304" pitchFamily="18" charset="0"/>
+                <a:cs typeface="Times New Roman" panose="02020603050405020304" pitchFamily="18" charset="0"/>
+              </a:endParaRPr>
+            </a:p>
+          </p:txBody>
+        </p:sp>
+      </p:grpSp>
+      <p:grpSp>
+        <p:nvGrpSpPr>
+          <p:cNvPr id="56" name="Group 55"/>
+          <p:cNvGrpSpPr/>
+          <p:nvPr/>
+        </p:nvGrpSpPr>
+        <p:grpSpPr>
+          <a:xfrm>
+            <a:off x="2517399" y="964878"/>
+            <a:ext cx="2604051" cy="1153862"/>
+            <a:chOff x="0" y="4862540"/>
+            <a:chExt cx="2604051" cy="1153862"/>
+          </a:xfrm>
+        </p:grpSpPr>
+        <p:sp>
+          <p:nvSpPr>
+            <p:cNvPr id="8" name="Rectangle 7"/>
+            <p:cNvSpPr/>
+            <p:nvPr/>
+          </p:nvSpPr>
+          <p:spPr>
+            <a:xfrm>
+              <a:off x="0" y="4862540"/>
+              <a:ext cx="2580404" cy="1153862"/>
+            </a:xfrm>
+            <a:prstGeom prst="rect">
+              <a:avLst/>
+            </a:prstGeom>
+            <a:noFill/>
+            <a:ln>
+              <a:solidFill>
+                <a:schemeClr val="tx1"/>
+              </a:solidFill>
+            </a:ln>
+          </p:spPr>
+          <p:style>
+            <a:lnRef idx="2">
+              <a:schemeClr val="accent1">
+                <a:shade val="50000"/>
+              </a:schemeClr>
+            </a:lnRef>
+            <a:fillRef idx="1">
+              <a:schemeClr val="accent1"/>
+            </a:fillRef>
+            <a:effectRef idx="0">
+              <a:schemeClr val="accent1"/>
+            </a:effectRef>
+            <a:fontRef idx="minor">
+              <a:schemeClr val="lt1"/>
+            </a:fontRef>
+          </p:style>
+          <p:txBody>
+            <a:bodyPr rtlCol="0" anchor="ctr"/>
+            <a:lstStyle/>
+            <a:p>
+              <a:pPr algn="ctr"/>
+              <a:endParaRPr lang="id-ID" sz="1200">
+                <a:latin typeface="Times New Roman" panose="02020603050405020304" pitchFamily="18" charset="0"/>
+                <a:cs typeface="Times New Roman" panose="02020603050405020304" pitchFamily="18" charset="0"/>
+              </a:endParaRPr>
+            </a:p>
+          </p:txBody>
+        </p:sp>
+        <p:sp>
+          <p:nvSpPr>
+            <p:cNvPr id="9" name="TextBox 8"/>
+            <p:cNvSpPr txBox="1"/>
+            <p:nvPr/>
+          </p:nvSpPr>
+          <p:spPr>
+            <a:xfrm>
+              <a:off x="61367" y="4931921"/>
+              <a:ext cx="2542684" cy="907941"/>
+            </a:xfrm>
+            <a:prstGeom prst="rect">
+              <a:avLst/>
+            </a:prstGeom>
+            <a:noFill/>
+          </p:spPr>
+          <p:txBody>
+            <a:bodyPr wrap="none" rtlCol="0">
+              <a:spAutoFit/>
+            </a:bodyPr>
+            <a:lstStyle/>
+            <a:p>
+              <a:pPr>
+                <a:spcAft>
+                  <a:spcPts val="600"/>
+                </a:spcAft>
+              </a:pPr>
+              <a:r>
+                <a:rPr lang="en-ID" sz="1200" dirty="0" err="1" smtClean="0">
+                  <a:latin typeface="Times New Roman" panose="02020603050405020304" pitchFamily="18" charset="0"/>
+                  <a:cs typeface="Times New Roman" panose="02020603050405020304" pitchFamily="18" charset="0"/>
+                </a:rPr>
+                <a:t>Pengumpulan</a:t>
+              </a:r>
+              <a:r>
+                <a:rPr lang="en-ID" sz="1200" dirty="0" smtClean="0">
+                  <a:latin typeface="Times New Roman" panose="02020603050405020304" pitchFamily="18" charset="0"/>
+                  <a:cs typeface="Times New Roman" panose="02020603050405020304" pitchFamily="18" charset="0"/>
+                </a:rPr>
+                <a:t> Data Time Series</a:t>
+              </a:r>
+              <a:endParaRPr lang="id-ID" sz="1200" dirty="0" smtClean="0">
+                <a:latin typeface="Times New Roman" panose="02020603050405020304" pitchFamily="18" charset="0"/>
+                <a:cs typeface="Times New Roman" panose="02020603050405020304" pitchFamily="18" charset="0"/>
+              </a:endParaRPr>
+            </a:p>
+            <a:p>
+              <a:pPr marL="228600" indent="-228600">
+                <a:buAutoNum type="arabicPeriod"/>
+              </a:pPr>
+              <a:r>
+                <a:rPr lang="en-ID" sz="1200" dirty="0" smtClean="0">
+                  <a:latin typeface="Times New Roman" panose="02020603050405020304" pitchFamily="18" charset="0"/>
+                  <a:cs typeface="Times New Roman" panose="02020603050405020304" pitchFamily="18" charset="0"/>
+                </a:rPr>
+                <a:t>Data </a:t>
+              </a:r>
+              <a:r>
+                <a:rPr lang="en-ID" sz="1200" dirty="0" err="1" smtClean="0">
+                  <a:latin typeface="Times New Roman" panose="02020603050405020304" pitchFamily="18" charset="0"/>
+                  <a:cs typeface="Times New Roman" panose="02020603050405020304" pitchFamily="18" charset="0"/>
+                </a:rPr>
+                <a:t>kurs</a:t>
+              </a:r>
+              <a:r>
+                <a:rPr lang="en-ID" sz="1200" dirty="0" smtClean="0">
+                  <a:latin typeface="Times New Roman" panose="02020603050405020304" pitchFamily="18" charset="0"/>
+                  <a:cs typeface="Times New Roman" panose="02020603050405020304" pitchFamily="18" charset="0"/>
+                </a:rPr>
+                <a:t> rupiah</a:t>
+              </a:r>
+            </a:p>
+            <a:p>
+              <a:pPr marL="228600" indent="-228600">
+                <a:buAutoNum type="arabicPeriod"/>
+              </a:pPr>
+              <a:r>
+                <a:rPr lang="en-ID" sz="1200" dirty="0" smtClean="0">
+                  <a:latin typeface="Times New Roman" panose="02020603050405020304" pitchFamily="18" charset="0"/>
+                  <a:cs typeface="Times New Roman" panose="02020603050405020304" pitchFamily="18" charset="0"/>
+                </a:rPr>
+                <a:t>Data </a:t>
+              </a:r>
+              <a:r>
+                <a:rPr lang="en-ID" sz="1200" dirty="0" err="1">
+                  <a:latin typeface="Times New Roman" panose="02020603050405020304" pitchFamily="18" charset="0"/>
+                  <a:cs typeface="Times New Roman" panose="02020603050405020304" pitchFamily="18" charset="0"/>
+                </a:rPr>
+                <a:t>k</a:t>
+              </a:r>
+              <a:r>
+                <a:rPr lang="en-ID" sz="1200" dirty="0" err="1" smtClean="0">
+                  <a:latin typeface="Times New Roman" panose="02020603050405020304" pitchFamily="18" charset="0"/>
+                  <a:cs typeface="Times New Roman" panose="02020603050405020304" pitchFamily="18" charset="0"/>
+                </a:rPr>
+                <a:t>limatologi</a:t>
+              </a:r>
+              <a:endParaRPr lang="en-ID" sz="1200" dirty="0" smtClean="0">
+                <a:latin typeface="Times New Roman" panose="02020603050405020304" pitchFamily="18" charset="0"/>
+                <a:cs typeface="Times New Roman" panose="02020603050405020304" pitchFamily="18" charset="0"/>
+              </a:endParaRPr>
+            </a:p>
+            <a:p>
+              <a:pPr marL="228600" indent="-228600">
+                <a:buAutoNum type="arabicPeriod"/>
+              </a:pPr>
+              <a:r>
+                <a:rPr lang="en-ID" sz="1200" dirty="0" smtClean="0">
+                  <a:latin typeface="Times New Roman" panose="02020603050405020304" pitchFamily="18" charset="0"/>
+                  <a:cs typeface="Times New Roman" panose="02020603050405020304" pitchFamily="18" charset="0"/>
+                </a:rPr>
+                <a:t>Data </a:t>
+              </a:r>
+              <a:r>
+                <a:rPr lang="en-ID" sz="1200" dirty="0" err="1" smtClean="0">
+                  <a:latin typeface="Times New Roman" panose="02020603050405020304" pitchFamily="18" charset="0"/>
+                  <a:cs typeface="Times New Roman" panose="02020603050405020304" pitchFamily="18" charset="0"/>
+                </a:rPr>
+                <a:t>sinar</a:t>
+              </a:r>
+              <a:r>
+                <a:rPr lang="en-ID" sz="1200" dirty="0" smtClean="0">
+                  <a:latin typeface="Times New Roman" panose="02020603050405020304" pitchFamily="18" charset="0"/>
+                  <a:cs typeface="Times New Roman" panose="02020603050405020304" pitchFamily="18" charset="0"/>
+                </a:rPr>
+                <a:t> </a:t>
+              </a:r>
+              <a:r>
+                <a:rPr lang="en-ID" sz="1200" dirty="0" err="1" smtClean="0">
+                  <a:latin typeface="Times New Roman" panose="02020603050405020304" pitchFamily="18" charset="0"/>
+                  <a:cs typeface="Times New Roman" panose="02020603050405020304" pitchFamily="18" charset="0"/>
+                </a:rPr>
+                <a:t>radiasi</a:t>
+              </a:r>
+              <a:r>
+                <a:rPr lang="en-ID" sz="1200" dirty="0" smtClean="0">
+                  <a:latin typeface="Times New Roman" panose="02020603050405020304" pitchFamily="18" charset="0"/>
+                  <a:cs typeface="Times New Roman" panose="02020603050405020304" pitchFamily="18" charset="0"/>
+                </a:rPr>
+                <a:t> </a:t>
+              </a:r>
+              <a:r>
+                <a:rPr lang="en-ID" sz="1200" dirty="0" err="1" smtClean="0">
+                  <a:latin typeface="Times New Roman" panose="02020603050405020304" pitchFamily="18" charset="0"/>
+                  <a:cs typeface="Times New Roman" panose="02020603050405020304" pitchFamily="18" charset="0"/>
+                </a:rPr>
+                <a:t>dan</a:t>
+              </a:r>
+              <a:r>
+                <a:rPr lang="en-ID" sz="1200" dirty="0" smtClean="0">
+                  <a:latin typeface="Times New Roman" panose="02020603050405020304" pitchFamily="18" charset="0"/>
+                  <a:cs typeface="Times New Roman" panose="02020603050405020304" pitchFamily="18" charset="0"/>
+                </a:rPr>
+                <a:t> </a:t>
+              </a:r>
+              <a:r>
+                <a:rPr lang="en-ID" sz="1200" dirty="0" err="1" smtClean="0">
+                  <a:latin typeface="Times New Roman" panose="02020603050405020304" pitchFamily="18" charset="0"/>
+                  <a:cs typeface="Times New Roman" panose="02020603050405020304" pitchFamily="18" charset="0"/>
+                </a:rPr>
+                <a:t>meteorologi</a:t>
+              </a:r>
+              <a:endParaRPr lang="en-ID" sz="1200" dirty="0" smtClean="0">
+                <a:latin typeface="Times New Roman" panose="02020603050405020304" pitchFamily="18" charset="0"/>
+                <a:cs typeface="Times New Roman" panose="02020603050405020304" pitchFamily="18" charset="0"/>
+              </a:endParaRPr>
+            </a:p>
+          </p:txBody>
+        </p:sp>
+      </p:grpSp>
+      <p:grpSp>
+        <p:nvGrpSpPr>
+          <p:cNvPr id="55" name="Group 54"/>
+          <p:cNvGrpSpPr/>
+          <p:nvPr/>
+        </p:nvGrpSpPr>
+        <p:grpSpPr>
+          <a:xfrm>
+            <a:off x="2511377" y="2466527"/>
+            <a:ext cx="5467772" cy="4338466"/>
+            <a:chOff x="4792334" y="1254468"/>
+            <a:chExt cx="5467772" cy="4233844"/>
+          </a:xfrm>
+        </p:grpSpPr>
+        <p:sp>
+          <p:nvSpPr>
+            <p:cNvPr id="10" name="Rectangle 9"/>
+            <p:cNvSpPr/>
+            <p:nvPr/>
+          </p:nvSpPr>
+          <p:spPr>
+            <a:xfrm>
+              <a:off x="4792334" y="1254468"/>
+              <a:ext cx="5467771" cy="4233844"/>
+            </a:xfrm>
+            <a:prstGeom prst="rect">
+              <a:avLst/>
+            </a:prstGeom>
+            <a:noFill/>
+            <a:ln w="12700">
+              <a:solidFill>
+                <a:schemeClr val="tx1"/>
+              </a:solidFill>
+              <a:prstDash val="solid"/>
+            </a:ln>
+          </p:spPr>
+          <p:style>
+            <a:lnRef idx="2">
+              <a:schemeClr val="accent6"/>
+            </a:lnRef>
+            <a:fillRef idx="1">
+              <a:schemeClr val="lt1"/>
+            </a:fillRef>
+            <a:effectRef idx="0">
+              <a:schemeClr val="accent6"/>
+            </a:effectRef>
+            <a:fontRef idx="minor">
+              <a:schemeClr val="dk1"/>
+            </a:fontRef>
+          </p:style>
+          <p:txBody>
+            <a:bodyPr rtlCol="0" anchor="ctr"/>
+            <a:lstStyle/>
+            <a:p>
+              <a:pPr algn="ctr"/>
+              <a:endParaRPr lang="id-ID"/>
+            </a:p>
+          </p:txBody>
+        </p:sp>
+        <p:sp>
+          <p:nvSpPr>
+            <p:cNvPr id="12" name="TextBox 11"/>
+            <p:cNvSpPr txBox="1"/>
+            <p:nvPr/>
+          </p:nvSpPr>
+          <p:spPr>
+            <a:xfrm>
+              <a:off x="4971894" y="1838317"/>
+              <a:ext cx="2431141" cy="276999"/>
+            </a:xfrm>
+            <a:prstGeom prst="rect">
+              <a:avLst/>
+            </a:prstGeom>
+            <a:noFill/>
+          </p:spPr>
+          <p:txBody>
+            <a:bodyPr wrap="square" rtlCol="0">
+              <a:spAutoFit/>
+            </a:bodyPr>
+            <a:lstStyle/>
+            <a:p>
+              <a:pPr algn="ctr"/>
+              <a:r>
+                <a:rPr lang="en-ID" sz="1200" dirty="0" smtClean="0">
+                  <a:latin typeface="Times New Roman" panose="02020603050405020304" pitchFamily="18" charset="0"/>
+                  <a:cs typeface="Times New Roman" panose="02020603050405020304" pitchFamily="18" charset="0"/>
+                </a:rPr>
+                <a:t>Data</a:t>
+              </a:r>
+              <a:endParaRPr lang="id-ID" sz="1200" dirty="0">
+                <a:latin typeface="Times New Roman" panose="02020603050405020304" pitchFamily="18" charset="0"/>
+                <a:cs typeface="Times New Roman" panose="02020603050405020304" pitchFamily="18" charset="0"/>
+              </a:endParaRPr>
+            </a:p>
+          </p:txBody>
+        </p:sp>
+        <p:sp>
+          <p:nvSpPr>
+            <p:cNvPr id="19" name="Rectangle 18"/>
+            <p:cNvSpPr/>
+            <p:nvPr/>
+          </p:nvSpPr>
+          <p:spPr>
+            <a:xfrm>
+              <a:off x="5117275" y="3832168"/>
+              <a:ext cx="2104570" cy="544076"/>
+            </a:xfrm>
+            <a:prstGeom prst="rect">
+              <a:avLst/>
+            </a:prstGeom>
+            <a:noFill/>
+            <a:ln>
+              <a:solidFill>
+                <a:schemeClr val="tx1"/>
+              </a:solidFill>
+            </a:ln>
+          </p:spPr>
+          <p:style>
+            <a:lnRef idx="2">
+              <a:schemeClr val="accent1">
+                <a:shade val="50000"/>
+              </a:schemeClr>
+            </a:lnRef>
+            <a:fillRef idx="1">
+              <a:schemeClr val="accent1"/>
+            </a:fillRef>
+            <a:effectRef idx="0">
+              <a:schemeClr val="accent1"/>
+            </a:effectRef>
+            <a:fontRef idx="minor">
+              <a:schemeClr val="lt1"/>
+            </a:fontRef>
+          </p:style>
+          <p:txBody>
+            <a:bodyPr rtlCol="0" anchor="ctr"/>
+            <a:lstStyle/>
+            <a:p>
+              <a:pPr algn="ctr"/>
+              <a:endParaRPr lang="id-ID" sz="1200">
+                <a:latin typeface="Times New Roman" panose="02020603050405020304" pitchFamily="18" charset="0"/>
+                <a:cs typeface="Times New Roman" panose="02020603050405020304" pitchFamily="18" charset="0"/>
+              </a:endParaRPr>
+            </a:p>
+          </p:txBody>
+        </p:sp>
+        <p:sp>
+          <p:nvSpPr>
+            <p:cNvPr id="20" name="TextBox 19"/>
+            <p:cNvSpPr txBox="1"/>
+            <p:nvPr/>
+          </p:nvSpPr>
+          <p:spPr>
+            <a:xfrm>
+              <a:off x="5117275" y="3978451"/>
+              <a:ext cx="2098304" cy="276999"/>
+            </a:xfrm>
+            <a:prstGeom prst="rect">
+              <a:avLst/>
+            </a:prstGeom>
+            <a:noFill/>
+          </p:spPr>
+          <p:txBody>
+            <a:bodyPr wrap="square" rtlCol="0">
+              <a:spAutoFit/>
+            </a:bodyPr>
+            <a:lstStyle/>
+            <a:p>
+              <a:pPr algn="ctr"/>
+              <a:r>
+                <a:rPr lang="id-ID" sz="1200" dirty="0" smtClean="0">
+                  <a:latin typeface="Times New Roman" panose="02020603050405020304" pitchFamily="18" charset="0"/>
+                  <a:cs typeface="Times New Roman" panose="02020603050405020304" pitchFamily="18" charset="0"/>
+                </a:rPr>
+                <a:t>Document Planning</a:t>
+              </a:r>
+              <a:endParaRPr lang="id-ID" sz="1200" dirty="0">
+                <a:latin typeface="Times New Roman" panose="02020603050405020304" pitchFamily="18" charset="0"/>
+                <a:cs typeface="Times New Roman" panose="02020603050405020304" pitchFamily="18" charset="0"/>
+              </a:endParaRPr>
+            </a:p>
+          </p:txBody>
+        </p:sp>
+        <p:sp>
+          <p:nvSpPr>
+            <p:cNvPr id="24" name="TextBox 23"/>
+            <p:cNvSpPr txBox="1"/>
+            <p:nvPr/>
+          </p:nvSpPr>
+          <p:spPr>
+            <a:xfrm>
+              <a:off x="7868445" y="2474277"/>
+              <a:ext cx="2104570" cy="1092607"/>
+            </a:xfrm>
+            <a:prstGeom prst="rect">
+              <a:avLst/>
+            </a:prstGeom>
+            <a:noFill/>
+          </p:spPr>
+          <p:txBody>
+            <a:bodyPr wrap="square" rtlCol="0">
+              <a:spAutoFit/>
+            </a:bodyPr>
+            <a:lstStyle/>
+            <a:p>
+              <a:pPr>
+                <a:spcAft>
+                  <a:spcPts val="600"/>
+                </a:spcAft>
+              </a:pPr>
+              <a:r>
+                <a:rPr lang="id-ID" sz="1200" dirty="0" smtClean="0">
+                  <a:latin typeface="Times New Roman" panose="02020603050405020304" pitchFamily="18" charset="0"/>
+                  <a:cs typeface="Times New Roman" panose="02020603050405020304" pitchFamily="18" charset="0"/>
+                </a:rPr>
+                <a:t>General </a:t>
+              </a:r>
+              <a:r>
+                <a:rPr lang="id-ID" sz="1200" dirty="0">
+                  <a:latin typeface="Times New Roman" panose="02020603050405020304" pitchFamily="18" charset="0"/>
+                  <a:cs typeface="Times New Roman" panose="02020603050405020304" pitchFamily="18" charset="0"/>
+                </a:rPr>
+                <a:t>Data </a:t>
+              </a:r>
+              <a:r>
+                <a:rPr lang="id-ID" sz="1200" dirty="0" smtClean="0">
+                  <a:latin typeface="Times New Roman" panose="02020603050405020304" pitchFamily="18" charset="0"/>
+                  <a:cs typeface="Times New Roman" panose="02020603050405020304" pitchFamily="18" charset="0"/>
+                </a:rPr>
+                <a:t>Handling</a:t>
+              </a:r>
+              <a:r>
+                <a:rPr lang="en-ID" sz="1200" dirty="0" smtClean="0">
+                  <a:latin typeface="Times New Roman" panose="02020603050405020304" pitchFamily="18" charset="0"/>
+                  <a:cs typeface="Times New Roman" panose="02020603050405020304" pitchFamily="18" charset="0"/>
+                </a:rPr>
+                <a:t>:</a:t>
+              </a:r>
+              <a:endParaRPr lang="id-ID" sz="1200" dirty="0">
+                <a:latin typeface="Times New Roman" panose="02020603050405020304" pitchFamily="18" charset="0"/>
+                <a:cs typeface="Times New Roman" panose="02020603050405020304" pitchFamily="18" charset="0"/>
+              </a:endParaRPr>
+            </a:p>
+            <a:p>
+              <a:pPr marL="228600" indent="-228600">
+                <a:buAutoNum type="arabicPeriod"/>
+              </a:pPr>
+              <a:r>
+                <a:rPr lang="en-ID" sz="1200" dirty="0" smtClean="0">
+                  <a:latin typeface="Times New Roman" panose="02020603050405020304" pitchFamily="18" charset="0"/>
+                  <a:cs typeface="Times New Roman" panose="02020603050405020304" pitchFamily="18" charset="0"/>
+                </a:rPr>
+                <a:t>Header Detection</a:t>
+              </a:r>
+            </a:p>
+            <a:p>
+              <a:pPr marL="228600" indent="-228600">
+                <a:buFontTx/>
+                <a:buAutoNum type="arabicPeriod"/>
+              </a:pPr>
+              <a:r>
+                <a:rPr lang="en-ID" sz="1200" dirty="0">
+                  <a:latin typeface="Times New Roman" panose="02020603050405020304" pitchFamily="18" charset="0"/>
+                  <a:cs typeface="Times New Roman" panose="02020603050405020304" pitchFamily="18" charset="0"/>
+                </a:rPr>
+                <a:t>User Defined Corpus</a:t>
+              </a:r>
+              <a:endParaRPr lang="id-ID" sz="1200" dirty="0">
+                <a:latin typeface="Times New Roman" panose="02020603050405020304" pitchFamily="18" charset="0"/>
+                <a:cs typeface="Times New Roman" panose="02020603050405020304" pitchFamily="18" charset="0"/>
+              </a:endParaRPr>
+            </a:p>
+            <a:p>
+              <a:pPr marL="228600" indent="-228600">
+                <a:buAutoNum type="arabicPeriod"/>
+              </a:pPr>
+              <a:r>
+                <a:rPr lang="en-ID" sz="1200" dirty="0">
+                  <a:latin typeface="Times New Roman" panose="02020603050405020304" pitchFamily="18" charset="0"/>
+                  <a:cs typeface="Times New Roman" panose="02020603050405020304" pitchFamily="18" charset="0"/>
+                </a:rPr>
+                <a:t>General </a:t>
+              </a:r>
+              <a:r>
+                <a:rPr lang="en-ID" sz="1200" dirty="0" smtClean="0">
+                  <a:latin typeface="Times New Roman" panose="02020603050405020304" pitchFamily="18" charset="0"/>
+                  <a:cs typeface="Times New Roman" panose="02020603050405020304" pitchFamily="18" charset="0"/>
+                </a:rPr>
+                <a:t>Fuzzy Generator</a:t>
+              </a:r>
+              <a:endParaRPr lang="en-ID" sz="1200" dirty="0" smtClean="0">
+                <a:latin typeface="Times New Roman" panose="02020603050405020304" pitchFamily="18" charset="0"/>
+                <a:cs typeface="Times New Roman" panose="02020603050405020304" pitchFamily="18" charset="0"/>
+              </a:endParaRPr>
+            </a:p>
+            <a:p>
+              <a:pPr marL="228600" indent="-228600">
+                <a:buAutoNum type="arabicPeriod"/>
+              </a:pPr>
+              <a:r>
+                <a:rPr lang="en-ID" sz="1200" dirty="0" smtClean="0">
+                  <a:latin typeface="Times New Roman" panose="02020603050405020304" pitchFamily="18" charset="0"/>
+                  <a:cs typeface="Times New Roman" panose="02020603050405020304" pitchFamily="18" charset="0"/>
+                </a:rPr>
+                <a:t>General Trend </a:t>
+              </a:r>
+              <a:r>
+                <a:rPr lang="en-ID" sz="1200" dirty="0">
+                  <a:latin typeface="Times New Roman" panose="02020603050405020304" pitchFamily="18" charset="0"/>
+                  <a:cs typeface="Times New Roman" panose="02020603050405020304" pitchFamily="18" charset="0"/>
+                </a:rPr>
+                <a:t>Generator</a:t>
+              </a:r>
+              <a:endParaRPr lang="en-ID" sz="1200" dirty="0" smtClean="0">
+                <a:latin typeface="Times New Roman" panose="02020603050405020304" pitchFamily="18" charset="0"/>
+                <a:cs typeface="Times New Roman" panose="02020603050405020304" pitchFamily="18" charset="0"/>
+              </a:endParaRPr>
+            </a:p>
+          </p:txBody>
+        </p:sp>
+        <p:sp>
+          <p:nvSpPr>
+            <p:cNvPr id="27" name="TextBox 26"/>
+            <p:cNvSpPr txBox="1"/>
+            <p:nvPr/>
+          </p:nvSpPr>
+          <p:spPr>
+            <a:xfrm>
+              <a:off x="4807912" y="1339142"/>
+              <a:ext cx="5452194" cy="276999"/>
+            </a:xfrm>
+            <a:prstGeom prst="rect">
+              <a:avLst/>
+            </a:prstGeom>
+            <a:noFill/>
+          </p:spPr>
+          <p:txBody>
+            <a:bodyPr wrap="square" rtlCol="0">
+              <a:spAutoFit/>
+            </a:bodyPr>
+            <a:lstStyle/>
+            <a:p>
+              <a:pPr algn="ctr"/>
+              <a:r>
+                <a:rPr lang="en-ID" sz="1200" dirty="0" err="1" smtClean="0">
+                  <a:latin typeface="Times New Roman" panose="02020603050405020304" pitchFamily="18" charset="0"/>
+                  <a:cs typeface="Times New Roman" panose="02020603050405020304" pitchFamily="18" charset="0"/>
+                </a:rPr>
+                <a:t>Pengembangan</a:t>
+              </a:r>
+              <a:r>
+                <a:rPr lang="en-ID" sz="1200" dirty="0" smtClean="0">
+                  <a:latin typeface="Times New Roman" panose="02020603050405020304" pitchFamily="18" charset="0"/>
+                  <a:cs typeface="Times New Roman" panose="02020603050405020304" pitchFamily="18" charset="0"/>
+                </a:rPr>
+                <a:t> Model D2T </a:t>
+              </a:r>
+              <a:r>
+                <a:rPr lang="en-ID" sz="1200" dirty="0" err="1" smtClean="0">
+                  <a:latin typeface="Times New Roman" panose="02020603050405020304" pitchFamily="18" charset="0"/>
+                  <a:cs typeface="Times New Roman" panose="02020603050405020304" pitchFamily="18" charset="0"/>
+                </a:rPr>
+                <a:t>untuk</a:t>
+              </a:r>
+              <a:r>
+                <a:rPr lang="en-ID" sz="1200" dirty="0" smtClean="0">
+                  <a:latin typeface="Times New Roman" panose="02020603050405020304" pitchFamily="18" charset="0"/>
+                  <a:cs typeface="Times New Roman" panose="02020603050405020304" pitchFamily="18" charset="0"/>
+                </a:rPr>
+                <a:t> Data General</a:t>
+              </a:r>
+              <a:endParaRPr lang="id-ID" sz="1200" dirty="0">
+                <a:latin typeface="Times New Roman" panose="02020603050405020304" pitchFamily="18" charset="0"/>
+                <a:cs typeface="Times New Roman" panose="02020603050405020304" pitchFamily="18" charset="0"/>
+              </a:endParaRPr>
+            </a:p>
+          </p:txBody>
+        </p:sp>
+        <p:cxnSp>
+          <p:nvCxnSpPr>
+            <p:cNvPr id="30" name="Straight Arrow Connector 29"/>
+            <p:cNvCxnSpPr/>
+            <p:nvPr/>
+          </p:nvCxnSpPr>
+          <p:spPr>
+            <a:xfrm>
+              <a:off x="6182092" y="2091474"/>
+              <a:ext cx="0" cy="223062"/>
+            </a:xfrm>
+            <a:prstGeom prst="straightConnector1">
+              <a:avLst/>
+            </a:prstGeom>
+            <a:ln>
+              <a:tailEnd type="triangle"/>
+            </a:ln>
+          </p:spPr>
+          <p:style>
+            <a:lnRef idx="1">
+              <a:schemeClr val="dk1"/>
+            </a:lnRef>
+            <a:fillRef idx="0">
+              <a:schemeClr val="dk1"/>
+            </a:fillRef>
+            <a:effectRef idx="0">
+              <a:schemeClr val="dk1"/>
+            </a:effectRef>
+            <a:fontRef idx="minor">
+              <a:schemeClr val="tx1"/>
+            </a:fontRef>
+          </p:style>
+        </p:cxnSp>
+        <p:sp>
+          <p:nvSpPr>
+            <p:cNvPr id="31" name="Rectangle 30"/>
+            <p:cNvSpPr/>
+            <p:nvPr/>
+          </p:nvSpPr>
+          <p:spPr>
+            <a:xfrm>
+              <a:off x="5123541" y="4598362"/>
+              <a:ext cx="2104570" cy="544076"/>
+            </a:xfrm>
+            <a:prstGeom prst="rect">
+              <a:avLst/>
+            </a:prstGeom>
+            <a:noFill/>
+            <a:ln>
+              <a:solidFill>
+                <a:schemeClr val="tx1"/>
+              </a:solidFill>
+            </a:ln>
+          </p:spPr>
+          <p:style>
+            <a:lnRef idx="2">
+              <a:schemeClr val="accent1">
+                <a:shade val="50000"/>
+              </a:schemeClr>
+            </a:lnRef>
+            <a:fillRef idx="1">
+              <a:schemeClr val="accent1"/>
+            </a:fillRef>
+            <a:effectRef idx="0">
+              <a:schemeClr val="accent1"/>
+            </a:effectRef>
+            <a:fontRef idx="minor">
+              <a:schemeClr val="lt1"/>
+            </a:fontRef>
+          </p:style>
+          <p:txBody>
+            <a:bodyPr rtlCol="0" anchor="ctr"/>
+            <a:lstStyle/>
+            <a:p>
+              <a:pPr algn="ctr"/>
+              <a:endParaRPr lang="id-ID" sz="1200">
+                <a:latin typeface="Times New Roman" panose="02020603050405020304" pitchFamily="18" charset="0"/>
+                <a:cs typeface="Times New Roman" panose="02020603050405020304" pitchFamily="18" charset="0"/>
+              </a:endParaRPr>
+            </a:p>
+          </p:txBody>
+        </p:sp>
+        <p:sp>
+          <p:nvSpPr>
+            <p:cNvPr id="32" name="TextBox 31"/>
+            <p:cNvSpPr txBox="1"/>
+            <p:nvPr/>
+          </p:nvSpPr>
+          <p:spPr>
+            <a:xfrm>
+              <a:off x="5123541" y="4744645"/>
+              <a:ext cx="2098304" cy="276999"/>
+            </a:xfrm>
+            <a:prstGeom prst="rect">
+              <a:avLst/>
+            </a:prstGeom>
+            <a:noFill/>
+          </p:spPr>
+          <p:txBody>
+            <a:bodyPr wrap="square" rtlCol="0">
+              <a:spAutoFit/>
+            </a:bodyPr>
+            <a:lstStyle/>
+            <a:p>
+              <a:pPr algn="ctr"/>
+              <a:r>
+                <a:rPr lang="id-ID" sz="1200" dirty="0" smtClean="0">
+                  <a:latin typeface="Times New Roman" panose="02020603050405020304" pitchFamily="18" charset="0"/>
+                  <a:cs typeface="Times New Roman" panose="02020603050405020304" pitchFamily="18" charset="0"/>
+                </a:rPr>
+                <a:t>Microplanning &amp; Realisation</a:t>
+              </a:r>
+              <a:endParaRPr lang="id-ID" sz="1200" dirty="0">
+                <a:latin typeface="Times New Roman" panose="02020603050405020304" pitchFamily="18" charset="0"/>
+                <a:cs typeface="Times New Roman" panose="02020603050405020304" pitchFamily="18" charset="0"/>
+              </a:endParaRPr>
+            </a:p>
+          </p:txBody>
+        </p:sp>
+        <p:cxnSp>
+          <p:nvCxnSpPr>
+            <p:cNvPr id="37" name="Straight Arrow Connector 36"/>
+            <p:cNvCxnSpPr/>
+            <p:nvPr/>
+          </p:nvCxnSpPr>
+          <p:spPr>
+            <a:xfrm>
+              <a:off x="6182092" y="2858612"/>
+              <a:ext cx="0" cy="223062"/>
+            </a:xfrm>
+            <a:prstGeom prst="straightConnector1">
+              <a:avLst/>
+            </a:prstGeom>
+            <a:ln>
+              <a:tailEnd type="triangle"/>
+            </a:ln>
+          </p:spPr>
+          <p:style>
+            <a:lnRef idx="1">
+              <a:schemeClr val="dk1"/>
+            </a:lnRef>
+            <a:fillRef idx="0">
+              <a:schemeClr val="dk1"/>
+            </a:fillRef>
+            <a:effectRef idx="0">
+              <a:schemeClr val="dk1"/>
+            </a:effectRef>
+            <a:fontRef idx="minor">
+              <a:schemeClr val="tx1"/>
+            </a:fontRef>
+          </p:style>
+        </p:cxnSp>
+        <p:sp>
+          <p:nvSpPr>
+            <p:cNvPr id="40" name="Rectangle 39"/>
+            <p:cNvSpPr/>
+            <p:nvPr/>
+          </p:nvSpPr>
+          <p:spPr>
+            <a:xfrm>
+              <a:off x="5129807" y="2314536"/>
+              <a:ext cx="2104570" cy="544076"/>
+            </a:xfrm>
+            <a:prstGeom prst="rect">
+              <a:avLst/>
+            </a:prstGeom>
+            <a:noFill/>
+            <a:ln>
+              <a:solidFill>
+                <a:schemeClr val="tx1"/>
+              </a:solidFill>
+            </a:ln>
+          </p:spPr>
+          <p:style>
+            <a:lnRef idx="2">
+              <a:schemeClr val="accent1">
+                <a:shade val="50000"/>
+              </a:schemeClr>
+            </a:lnRef>
+            <a:fillRef idx="1">
+              <a:schemeClr val="accent1"/>
+            </a:fillRef>
+            <a:effectRef idx="0">
+              <a:schemeClr val="accent1"/>
+            </a:effectRef>
+            <a:fontRef idx="minor">
+              <a:schemeClr val="lt1"/>
+            </a:fontRef>
+          </p:style>
+          <p:txBody>
+            <a:bodyPr rtlCol="0" anchor="ctr"/>
+            <a:lstStyle/>
+            <a:p>
+              <a:pPr algn="ctr"/>
+              <a:endParaRPr lang="id-ID" sz="1200">
+                <a:latin typeface="Times New Roman" panose="02020603050405020304" pitchFamily="18" charset="0"/>
+                <a:cs typeface="Times New Roman" panose="02020603050405020304" pitchFamily="18" charset="0"/>
+              </a:endParaRPr>
+            </a:p>
+          </p:txBody>
+        </p:sp>
+        <p:sp>
+          <p:nvSpPr>
+            <p:cNvPr id="41" name="TextBox 40"/>
+            <p:cNvSpPr txBox="1"/>
+            <p:nvPr/>
+          </p:nvSpPr>
+          <p:spPr>
+            <a:xfrm>
+              <a:off x="5129807" y="2460819"/>
+              <a:ext cx="2098304" cy="276999"/>
+            </a:xfrm>
+            <a:prstGeom prst="rect">
+              <a:avLst/>
+            </a:prstGeom>
+            <a:noFill/>
+          </p:spPr>
+          <p:txBody>
+            <a:bodyPr wrap="square" rtlCol="0">
+              <a:spAutoFit/>
+            </a:bodyPr>
+            <a:lstStyle/>
+            <a:p>
+              <a:pPr algn="ctr"/>
+              <a:r>
+                <a:rPr lang="id-ID" sz="1200" dirty="0" smtClean="0">
+                  <a:latin typeface="Times New Roman" panose="02020603050405020304" pitchFamily="18" charset="0"/>
+                  <a:cs typeface="Times New Roman" panose="02020603050405020304" pitchFamily="18" charset="0"/>
+                </a:rPr>
+                <a:t>Sygnal Analisys</a:t>
+              </a:r>
+              <a:endParaRPr lang="id-ID" sz="1200" dirty="0">
+                <a:latin typeface="Times New Roman" panose="02020603050405020304" pitchFamily="18" charset="0"/>
+                <a:cs typeface="Times New Roman" panose="02020603050405020304" pitchFamily="18" charset="0"/>
+              </a:endParaRPr>
+            </a:p>
+          </p:txBody>
+        </p:sp>
+        <p:sp>
+          <p:nvSpPr>
+            <p:cNvPr id="42" name="Rectangle 41"/>
+            <p:cNvSpPr/>
+            <p:nvPr/>
+          </p:nvSpPr>
+          <p:spPr>
+            <a:xfrm>
+              <a:off x="5123541" y="3070021"/>
+              <a:ext cx="2104570" cy="544076"/>
+            </a:xfrm>
+            <a:prstGeom prst="rect">
+              <a:avLst/>
+            </a:prstGeom>
+            <a:noFill/>
+            <a:ln>
+              <a:solidFill>
+                <a:schemeClr val="tx1"/>
+              </a:solidFill>
+            </a:ln>
+          </p:spPr>
+          <p:style>
+            <a:lnRef idx="2">
+              <a:schemeClr val="accent1">
+                <a:shade val="50000"/>
+              </a:schemeClr>
+            </a:lnRef>
+            <a:fillRef idx="1">
+              <a:schemeClr val="accent1"/>
+            </a:fillRef>
+            <a:effectRef idx="0">
+              <a:schemeClr val="accent1"/>
+            </a:effectRef>
+            <a:fontRef idx="minor">
+              <a:schemeClr val="lt1"/>
+            </a:fontRef>
+          </p:style>
+          <p:txBody>
+            <a:bodyPr rtlCol="0" anchor="ctr"/>
+            <a:lstStyle/>
+            <a:p>
+              <a:pPr algn="ctr"/>
+              <a:endParaRPr lang="id-ID" sz="1200">
+                <a:latin typeface="Times New Roman" panose="02020603050405020304" pitchFamily="18" charset="0"/>
+                <a:cs typeface="Times New Roman" panose="02020603050405020304" pitchFamily="18" charset="0"/>
+              </a:endParaRPr>
+            </a:p>
+          </p:txBody>
+        </p:sp>
+        <p:sp>
+          <p:nvSpPr>
+            <p:cNvPr id="43" name="TextBox 42"/>
+            <p:cNvSpPr txBox="1"/>
+            <p:nvPr/>
+          </p:nvSpPr>
+          <p:spPr>
+            <a:xfrm>
+              <a:off x="5123541" y="3216304"/>
+              <a:ext cx="2098304" cy="276999"/>
+            </a:xfrm>
+            <a:prstGeom prst="rect">
+              <a:avLst/>
+            </a:prstGeom>
+            <a:noFill/>
+          </p:spPr>
+          <p:txBody>
+            <a:bodyPr wrap="square" rtlCol="0">
+              <a:spAutoFit/>
+            </a:bodyPr>
+            <a:lstStyle/>
+            <a:p>
+              <a:pPr algn="ctr"/>
+              <a:r>
+                <a:rPr lang="en-ID" sz="1200" dirty="0" smtClean="0">
+                  <a:latin typeface="Times New Roman" panose="02020603050405020304" pitchFamily="18" charset="0"/>
+                  <a:cs typeface="Times New Roman" panose="02020603050405020304" pitchFamily="18" charset="0"/>
+                </a:rPr>
+                <a:t>Data Interpretation</a:t>
+              </a:r>
+              <a:endParaRPr lang="id-ID" sz="1200" dirty="0">
+                <a:latin typeface="Times New Roman" panose="02020603050405020304" pitchFamily="18" charset="0"/>
+                <a:cs typeface="Times New Roman" panose="02020603050405020304" pitchFamily="18" charset="0"/>
+              </a:endParaRPr>
+            </a:p>
+          </p:txBody>
+        </p:sp>
+        <p:cxnSp>
+          <p:nvCxnSpPr>
+            <p:cNvPr id="44" name="Straight Arrow Connector 43"/>
+            <p:cNvCxnSpPr/>
+            <p:nvPr/>
+          </p:nvCxnSpPr>
+          <p:spPr>
+            <a:xfrm>
+              <a:off x="6182092" y="3614097"/>
+              <a:ext cx="0" cy="223062"/>
+            </a:xfrm>
+            <a:prstGeom prst="straightConnector1">
+              <a:avLst/>
+            </a:prstGeom>
+            <a:ln>
+              <a:tailEnd type="triangle"/>
+            </a:ln>
+          </p:spPr>
+          <p:style>
+            <a:lnRef idx="1">
+              <a:schemeClr val="dk1"/>
+            </a:lnRef>
+            <a:fillRef idx="0">
+              <a:schemeClr val="dk1"/>
+            </a:fillRef>
+            <a:effectRef idx="0">
+              <a:schemeClr val="dk1"/>
+            </a:effectRef>
+            <a:fontRef idx="minor">
+              <a:schemeClr val="tx1"/>
+            </a:fontRef>
+          </p:style>
+        </p:cxnSp>
+        <p:cxnSp>
+          <p:nvCxnSpPr>
+            <p:cNvPr id="46" name="Straight Arrow Connector 45"/>
+            <p:cNvCxnSpPr/>
+            <p:nvPr/>
+          </p:nvCxnSpPr>
+          <p:spPr>
+            <a:xfrm>
+              <a:off x="6187465" y="4376244"/>
+              <a:ext cx="0" cy="223062"/>
+            </a:xfrm>
+            <a:prstGeom prst="straightConnector1">
+              <a:avLst/>
+            </a:prstGeom>
+            <a:ln>
+              <a:tailEnd type="triangle"/>
+            </a:ln>
+          </p:spPr>
+          <p:style>
+            <a:lnRef idx="1">
+              <a:schemeClr val="dk1"/>
+            </a:lnRef>
+            <a:fillRef idx="0">
+              <a:schemeClr val="dk1"/>
+            </a:fillRef>
+            <a:effectRef idx="0">
+              <a:schemeClr val="dk1"/>
+            </a:effectRef>
+            <a:fontRef idx="minor">
+              <a:schemeClr val="tx1"/>
+            </a:fontRef>
+          </p:style>
+        </p:cxnSp>
+        <p:sp>
+          <p:nvSpPr>
+            <p:cNvPr id="49" name="Rectangle 48"/>
+            <p:cNvSpPr/>
+            <p:nvPr/>
+          </p:nvSpPr>
+          <p:spPr>
+            <a:xfrm>
+              <a:off x="7747420" y="2314536"/>
+              <a:ext cx="2104570" cy="1299561"/>
+            </a:xfrm>
+            <a:prstGeom prst="rect">
+              <a:avLst/>
+            </a:prstGeom>
+            <a:noFill/>
+            <a:ln>
+              <a:solidFill>
+                <a:schemeClr val="tx1"/>
+              </a:solidFill>
+            </a:ln>
+          </p:spPr>
+          <p:style>
+            <a:lnRef idx="2">
+              <a:schemeClr val="accent1">
+                <a:shade val="50000"/>
+              </a:schemeClr>
+            </a:lnRef>
+            <a:fillRef idx="1">
+              <a:schemeClr val="accent1"/>
+            </a:fillRef>
+            <a:effectRef idx="0">
+              <a:schemeClr val="accent1"/>
+            </a:effectRef>
+            <a:fontRef idx="minor">
+              <a:schemeClr val="lt1"/>
+            </a:fontRef>
+          </p:style>
+          <p:txBody>
+            <a:bodyPr rtlCol="0" anchor="ctr"/>
+            <a:lstStyle/>
+            <a:p>
+              <a:pPr algn="ctr"/>
+              <a:endParaRPr lang="id-ID" sz="1200">
+                <a:latin typeface="Times New Roman" panose="02020603050405020304" pitchFamily="18" charset="0"/>
+                <a:cs typeface="Times New Roman" panose="02020603050405020304" pitchFamily="18" charset="0"/>
+              </a:endParaRPr>
+            </a:p>
+          </p:txBody>
+        </p:sp>
+        <p:cxnSp>
+          <p:nvCxnSpPr>
+            <p:cNvPr id="51" name="Straight Arrow Connector 50"/>
+            <p:cNvCxnSpPr/>
+            <p:nvPr/>
+          </p:nvCxnSpPr>
+          <p:spPr>
+            <a:xfrm flipH="1">
+              <a:off x="7228111" y="2513013"/>
+              <a:ext cx="519309" cy="0"/>
+            </a:xfrm>
+            <a:prstGeom prst="straightConnector1">
+              <a:avLst/>
+            </a:prstGeom>
+            <a:ln>
+              <a:tailEnd type="triangle"/>
+            </a:ln>
+          </p:spPr>
+          <p:style>
+            <a:lnRef idx="1">
+              <a:schemeClr val="dk1"/>
+            </a:lnRef>
+            <a:fillRef idx="0">
+              <a:schemeClr val="dk1"/>
+            </a:fillRef>
+            <a:effectRef idx="0">
+              <a:schemeClr val="dk1"/>
+            </a:effectRef>
+            <a:fontRef idx="minor">
+              <a:schemeClr val="tx1"/>
+            </a:fontRef>
+          </p:style>
+        </p:cxnSp>
+        <p:cxnSp>
+          <p:nvCxnSpPr>
+            <p:cNvPr id="53" name="Straight Arrow Connector 52"/>
+            <p:cNvCxnSpPr>
+              <a:endCxn id="42" idx="3"/>
+            </p:cNvCxnSpPr>
+            <p:nvPr/>
+          </p:nvCxnSpPr>
+          <p:spPr>
+            <a:xfrm flipH="1" flipV="1">
+              <a:off x="7228111" y="3342059"/>
+              <a:ext cx="519309" cy="604"/>
+            </a:xfrm>
+            <a:prstGeom prst="straightConnector1">
+              <a:avLst/>
+            </a:prstGeom>
+            <a:ln>
+              <a:tailEnd type="triangle"/>
+            </a:ln>
+          </p:spPr>
+          <p:style>
+            <a:lnRef idx="1">
+              <a:schemeClr val="dk1"/>
+            </a:lnRef>
+            <a:fillRef idx="0">
+              <a:schemeClr val="dk1"/>
+            </a:fillRef>
+            <a:effectRef idx="0">
+              <a:schemeClr val="dk1"/>
+            </a:effectRef>
+            <a:fontRef idx="minor">
+              <a:schemeClr val="tx1"/>
+            </a:fontRef>
+          </p:style>
+        </p:cxnSp>
+      </p:grpSp>
+      <p:grpSp>
+        <p:nvGrpSpPr>
+          <p:cNvPr id="64" name="Group 63"/>
+          <p:cNvGrpSpPr/>
+          <p:nvPr/>
+        </p:nvGrpSpPr>
+        <p:grpSpPr>
+          <a:xfrm>
+            <a:off x="2511377" y="7007796"/>
+            <a:ext cx="2580404" cy="1731272"/>
+            <a:chOff x="0" y="4460040"/>
+            <a:chExt cx="2580404" cy="1556363"/>
+          </a:xfrm>
+        </p:grpSpPr>
+        <p:sp>
+          <p:nvSpPr>
+            <p:cNvPr id="65" name="Rectangle 64"/>
+            <p:cNvSpPr/>
+            <p:nvPr/>
+          </p:nvSpPr>
+          <p:spPr>
+            <a:xfrm>
+              <a:off x="0" y="4460040"/>
+              <a:ext cx="2580404" cy="1556363"/>
+            </a:xfrm>
+            <a:prstGeom prst="rect">
+              <a:avLst/>
+            </a:prstGeom>
+            <a:noFill/>
+            <a:ln>
+              <a:solidFill>
+                <a:schemeClr val="tx1"/>
+              </a:solidFill>
+            </a:ln>
+          </p:spPr>
+          <p:style>
+            <a:lnRef idx="2">
+              <a:schemeClr val="accent1">
+                <a:shade val="50000"/>
+              </a:schemeClr>
+            </a:lnRef>
+            <a:fillRef idx="1">
+              <a:schemeClr val="accent1"/>
+            </a:fillRef>
+            <a:effectRef idx="0">
+              <a:schemeClr val="accent1"/>
+            </a:effectRef>
+            <a:fontRef idx="minor">
+              <a:schemeClr val="lt1"/>
+            </a:fontRef>
+          </p:style>
+          <p:txBody>
+            <a:bodyPr rtlCol="0" anchor="ctr"/>
+            <a:lstStyle/>
+            <a:p>
+              <a:pPr algn="ctr"/>
+              <a:endParaRPr lang="id-ID" sz="1200">
+                <a:latin typeface="Times New Roman" panose="02020603050405020304" pitchFamily="18" charset="0"/>
+                <a:cs typeface="Times New Roman" panose="02020603050405020304" pitchFamily="18" charset="0"/>
+              </a:endParaRPr>
+            </a:p>
+          </p:txBody>
+        </p:sp>
+        <p:sp>
+          <p:nvSpPr>
+            <p:cNvPr id="66" name="TextBox 65"/>
+            <p:cNvSpPr txBox="1"/>
+            <p:nvPr/>
+          </p:nvSpPr>
+          <p:spPr>
+            <a:xfrm>
+              <a:off x="37720" y="4588316"/>
+              <a:ext cx="1527982" cy="1314241"/>
+            </a:xfrm>
+            <a:prstGeom prst="rect">
+              <a:avLst/>
+            </a:prstGeom>
+            <a:noFill/>
+          </p:spPr>
+          <p:txBody>
+            <a:bodyPr wrap="none" rtlCol="0">
+              <a:spAutoFit/>
+            </a:bodyPr>
+            <a:lstStyle/>
+            <a:p>
+              <a:pPr>
+                <a:spcAft>
+                  <a:spcPts val="600"/>
+                </a:spcAft>
+              </a:pPr>
+              <a:r>
+                <a:rPr lang="en-ID" sz="1200" dirty="0" err="1" smtClean="0">
+                  <a:latin typeface="Times New Roman" panose="02020603050405020304" pitchFamily="18" charset="0"/>
+                  <a:cs typeface="Times New Roman" panose="02020603050405020304" pitchFamily="18" charset="0"/>
+                </a:rPr>
+                <a:t>Implementasi</a:t>
+              </a:r>
+              <a:r>
+                <a:rPr lang="en-ID" sz="1200" dirty="0" smtClean="0">
+                  <a:latin typeface="Times New Roman" panose="02020603050405020304" pitchFamily="18" charset="0"/>
+                  <a:cs typeface="Times New Roman" panose="02020603050405020304" pitchFamily="18" charset="0"/>
+                </a:rPr>
+                <a:t> </a:t>
+              </a:r>
+              <a:r>
+                <a:rPr lang="en-ID" sz="1200" dirty="0" err="1" smtClean="0">
+                  <a:latin typeface="Times New Roman" panose="02020603050405020304" pitchFamily="18" charset="0"/>
+                  <a:cs typeface="Times New Roman" panose="02020603050405020304" pitchFamily="18" charset="0"/>
+                </a:rPr>
+                <a:t>Sistem</a:t>
+              </a:r>
+              <a:r>
+                <a:rPr lang="en-ID" sz="1200" dirty="0" smtClean="0">
+                  <a:latin typeface="Times New Roman" panose="02020603050405020304" pitchFamily="18" charset="0"/>
+                  <a:cs typeface="Times New Roman" panose="02020603050405020304" pitchFamily="18" charset="0"/>
+                </a:rPr>
+                <a:t>:</a:t>
+              </a:r>
+              <a:endParaRPr lang="id-ID" sz="1200" dirty="0" smtClean="0">
+                <a:latin typeface="Times New Roman" panose="02020603050405020304" pitchFamily="18" charset="0"/>
+                <a:cs typeface="Times New Roman" panose="02020603050405020304" pitchFamily="18" charset="0"/>
+              </a:endParaRPr>
+            </a:p>
+            <a:p>
+              <a:pPr marL="228600" indent="-228600">
+                <a:buAutoNum type="arabicPeriod"/>
+              </a:pPr>
+              <a:r>
+                <a:rPr lang="en-ID" sz="1200" dirty="0" smtClean="0">
+                  <a:latin typeface="Times New Roman" panose="02020603050405020304" pitchFamily="18" charset="0"/>
+                  <a:cs typeface="Times New Roman" panose="02020603050405020304" pitchFamily="18" charset="0"/>
+                </a:rPr>
+                <a:t>Analysis</a:t>
+              </a:r>
+            </a:p>
+            <a:p>
+              <a:pPr marL="228600" indent="-228600">
+                <a:buAutoNum type="arabicPeriod"/>
+              </a:pPr>
+              <a:r>
+                <a:rPr lang="en-ID" sz="1200" dirty="0" smtClean="0">
+                  <a:latin typeface="Times New Roman" panose="02020603050405020304" pitchFamily="18" charset="0"/>
+                  <a:cs typeface="Times New Roman" panose="02020603050405020304" pitchFamily="18" charset="0"/>
+                </a:rPr>
+                <a:t>Design</a:t>
+              </a:r>
+            </a:p>
+            <a:p>
+              <a:pPr marL="228600" indent="-228600">
+                <a:buAutoNum type="arabicPeriod"/>
+              </a:pPr>
+              <a:r>
+                <a:rPr lang="en-ID" sz="1200" dirty="0" smtClean="0">
+                  <a:latin typeface="Times New Roman" panose="02020603050405020304" pitchFamily="18" charset="0"/>
+                  <a:cs typeface="Times New Roman" panose="02020603050405020304" pitchFamily="18" charset="0"/>
+                </a:rPr>
+                <a:t>Coding</a:t>
+              </a:r>
+            </a:p>
+            <a:p>
+              <a:pPr marL="228600" indent="-228600">
+                <a:buAutoNum type="arabicPeriod"/>
+              </a:pPr>
+              <a:r>
+                <a:rPr lang="en-ID" sz="1200" dirty="0" smtClean="0">
+                  <a:latin typeface="Times New Roman" panose="02020603050405020304" pitchFamily="18" charset="0"/>
+                  <a:cs typeface="Times New Roman" panose="02020603050405020304" pitchFamily="18" charset="0"/>
+                </a:rPr>
+                <a:t>Testing</a:t>
+              </a:r>
+            </a:p>
+            <a:p>
+              <a:pPr marL="228600" indent="-228600">
+                <a:buAutoNum type="arabicPeriod"/>
+              </a:pPr>
+              <a:r>
+                <a:rPr lang="en-ID" sz="1200" dirty="0" smtClean="0">
+                  <a:latin typeface="Times New Roman" panose="02020603050405020304" pitchFamily="18" charset="0"/>
+                  <a:cs typeface="Times New Roman" panose="02020603050405020304" pitchFamily="18" charset="0"/>
+                </a:rPr>
+                <a:t>Deployment</a:t>
+              </a:r>
+            </a:p>
+            <a:p>
+              <a:pPr marL="228600" indent="-228600">
+                <a:buAutoNum type="arabicPeriod"/>
+              </a:pPr>
+              <a:r>
+                <a:rPr lang="en-ID" sz="1200" dirty="0" smtClean="0">
+                  <a:latin typeface="Times New Roman" panose="02020603050405020304" pitchFamily="18" charset="0"/>
+                  <a:cs typeface="Times New Roman" panose="02020603050405020304" pitchFamily="18" charset="0"/>
+                </a:rPr>
+                <a:t>Maintenance</a:t>
+              </a:r>
+              <a:endParaRPr lang="en-ID" sz="1200" dirty="0" smtClean="0">
+                <a:latin typeface="Times New Roman" panose="02020603050405020304" pitchFamily="18" charset="0"/>
+                <a:cs typeface="Times New Roman" panose="02020603050405020304" pitchFamily="18" charset="0"/>
+              </a:endParaRPr>
+            </a:p>
+          </p:txBody>
+        </p:sp>
+      </p:grpSp>
+      <p:sp>
+        <p:nvSpPr>
+          <p:cNvPr id="71" name="Rectangle 70"/>
           <p:cNvSpPr/>
           <p:nvPr/>
         </p:nvSpPr>
         <p:spPr>
           <a:xfrm>
-            <a:off x="0" y="0"/>
-            <a:ext cx="2580404" cy="1556363"/>
+            <a:off x="5319960" y="7783290"/>
+            <a:ext cx="2561292" cy="568893"/>
           </a:xfrm>
           <a:prstGeom prst="rect">
             <a:avLst/>
@@ -5226,14 +6936,14 @@
       </p:sp>
       <p:sp>
         <p:nvSpPr>
-          <p:cNvPr id="5" name="TextBox 4"/>
+          <p:cNvPr id="72" name="TextBox 71"/>
           <p:cNvSpPr txBox="1"/>
           <p:nvPr/>
         </p:nvSpPr>
         <p:spPr>
           <a:xfrm>
-            <a:off x="178860" y="246535"/>
-            <a:ext cx="2260555" cy="1092607"/>
+            <a:off x="5376288" y="7938695"/>
+            <a:ext cx="2542684" cy="276999"/>
           </a:xfrm>
           <a:prstGeom prst="rect">
             <a:avLst/>
@@ -5241,81 +6951,46 @@
           <a:noFill/>
         </p:spPr>
         <p:txBody>
-          <a:bodyPr wrap="none" rtlCol="0">
+          <a:bodyPr wrap="square" rtlCol="0">
             <a:spAutoFit/>
           </a:bodyPr>
           <a:lstStyle/>
           <a:p>
-            <a:pPr>
-              <a:spcAft>
-                <a:spcPts val="600"/>
-              </a:spcAft>
-            </a:pPr>
-            <a:r>
-              <a:rPr lang="id-ID" sz="1200" dirty="0" smtClean="0">
-                <a:latin typeface="Times New Roman" panose="02020603050405020304" pitchFamily="18" charset="0"/>
-                <a:cs typeface="Times New Roman" panose="02020603050405020304" pitchFamily="18" charset="0"/>
-              </a:rPr>
-              <a:t>Tahap Persiapan:</a:t>
-            </a:r>
-          </a:p>
-          <a:p>
-            <a:pPr marL="228600" indent="-228600">
-              <a:buAutoNum type="arabicPeriod"/>
-            </a:pPr>
-            <a:r>
-              <a:rPr lang="id-ID" sz="1200" dirty="0" smtClean="0">
-                <a:latin typeface="Times New Roman" panose="02020603050405020304" pitchFamily="18" charset="0"/>
-                <a:cs typeface="Times New Roman" panose="02020603050405020304" pitchFamily="18" charset="0"/>
-              </a:rPr>
-              <a:t>Identifikasi masalah</a:t>
-            </a:r>
-          </a:p>
-          <a:p>
-            <a:pPr marL="228600" indent="-228600">
-              <a:buAutoNum type="arabicPeriod"/>
-            </a:pPr>
-            <a:r>
-              <a:rPr lang="id-ID" sz="1200" dirty="0" smtClean="0">
-                <a:latin typeface="Times New Roman" panose="02020603050405020304" pitchFamily="18" charset="0"/>
-                <a:cs typeface="Times New Roman" panose="02020603050405020304" pitchFamily="18" charset="0"/>
-              </a:rPr>
-              <a:t>Merumuskan masalah</a:t>
-            </a:r>
-          </a:p>
-          <a:p>
-            <a:pPr marL="228600" indent="-228600">
-              <a:buAutoNum type="arabicPeriod"/>
-            </a:pPr>
-            <a:r>
-              <a:rPr lang="id-ID" sz="1200" dirty="0" smtClean="0">
-                <a:latin typeface="Times New Roman" panose="02020603050405020304" pitchFamily="18" charset="0"/>
-                <a:cs typeface="Times New Roman" panose="02020603050405020304" pitchFamily="18" charset="0"/>
-              </a:rPr>
-              <a:t>Menentukan </a:t>
-            </a:r>
+            <a:pPr algn="ctr"/>
             <a:r>
               <a:rPr lang="en-ID" sz="1200" dirty="0" err="1" smtClean="0">
                 <a:latin typeface="Times New Roman" panose="02020603050405020304" pitchFamily="18" charset="0"/>
                 <a:cs typeface="Times New Roman" panose="02020603050405020304" pitchFamily="18" charset="0"/>
               </a:rPr>
-              <a:t>metode</a:t>
-            </a:r>
-            <a:endParaRPr lang="id-ID" sz="1200" dirty="0" smtClean="0">
-              <a:latin typeface="Times New Roman" panose="02020603050405020304" pitchFamily="18" charset="0"/>
-              <a:cs typeface="Times New Roman" panose="02020603050405020304" pitchFamily="18" charset="0"/>
-            </a:endParaRPr>
-          </a:p>
-          <a:p>
-            <a:pPr marL="228600" indent="-228600">
-              <a:buAutoNum type="arabicPeriod"/>
-            </a:pPr>
-            <a:r>
-              <a:rPr lang="id-ID" sz="1200" dirty="0" smtClean="0">
+              <a:t>Analisis</a:t>
+            </a:r>
+            <a:r>
+              <a:rPr lang="en-ID" sz="1200" dirty="0" smtClean="0">
                 <a:latin typeface="Times New Roman" panose="02020603050405020304" pitchFamily="18" charset="0"/>
                 <a:cs typeface="Times New Roman" panose="02020603050405020304" pitchFamily="18" charset="0"/>
               </a:rPr>
-              <a:t>Menentukan model penelitian</a:t>
+              <a:t> </a:t>
+            </a:r>
+            <a:r>
+              <a:rPr lang="en-ID" sz="1200" dirty="0" err="1" smtClean="0">
+                <a:latin typeface="Times New Roman" panose="02020603050405020304" pitchFamily="18" charset="0"/>
+                <a:cs typeface="Times New Roman" panose="02020603050405020304" pitchFamily="18" charset="0"/>
+              </a:rPr>
+              <a:t>Hasil</a:t>
+            </a:r>
+            <a:r>
+              <a:rPr lang="en-ID" sz="1200" dirty="0" smtClean="0">
+                <a:latin typeface="Times New Roman" panose="02020603050405020304" pitchFamily="18" charset="0"/>
+                <a:cs typeface="Times New Roman" panose="02020603050405020304" pitchFamily="18" charset="0"/>
+              </a:rPr>
+              <a:t> </a:t>
+            </a:r>
+            <a:r>
+              <a:rPr lang="en-ID" sz="1200" dirty="0" err="1" smtClean="0">
+                <a:latin typeface="Times New Roman" panose="02020603050405020304" pitchFamily="18" charset="0"/>
+                <a:cs typeface="Times New Roman" panose="02020603050405020304" pitchFamily="18" charset="0"/>
+              </a:rPr>
+              <a:t>Eksperimen</a:t>
             </a:r>
             <a:endParaRPr lang="id-ID" sz="1200" dirty="0">
               <a:latin typeface="Times New Roman" panose="02020603050405020304" pitchFamily="18" charset="0"/>
@@ -5326,14 +7001,14 @@
       </p:sp>
       <p:sp>
         <p:nvSpPr>
-          <p:cNvPr id="6" name="Rectangle 5"/>
+          <p:cNvPr id="73" name="Rectangle 72"/>
           <p:cNvSpPr/>
           <p:nvPr/>
         </p:nvSpPr>
         <p:spPr>
           <a:xfrm>
-            <a:off x="0" y="1906503"/>
-            <a:ext cx="2580404" cy="2203396"/>
+            <a:off x="5335537" y="9330480"/>
+            <a:ext cx="2561292" cy="568893"/>
           </a:xfrm>
           <a:prstGeom prst="rect">
             <a:avLst/>
@@ -5375,14 +7050,14 @@
       </p:sp>
       <p:sp>
         <p:nvSpPr>
-          <p:cNvPr id="7" name="TextBox 6"/>
+          <p:cNvPr id="74" name="TextBox 73"/>
           <p:cNvSpPr txBox="1"/>
           <p:nvPr/>
         </p:nvSpPr>
         <p:spPr>
           <a:xfrm>
-            <a:off x="191560" y="2150263"/>
-            <a:ext cx="2239267" cy="1831271"/>
+            <a:off x="5335537" y="9466303"/>
+            <a:ext cx="2542684" cy="276999"/>
           </a:xfrm>
           <a:prstGeom prst="rect">
             <a:avLst/>
@@ -5390,172 +7065,50 @@
           <a:noFill/>
         </p:spPr>
         <p:txBody>
-          <a:bodyPr wrap="none" rtlCol="0">
+          <a:bodyPr wrap="square" rtlCol="0">
             <a:spAutoFit/>
           </a:bodyPr>
           <a:lstStyle/>
           <a:p>
-            <a:pPr>
-              <a:spcAft>
-                <a:spcPts val="600"/>
-              </a:spcAft>
-            </a:pPr>
-            <a:r>
-              <a:rPr lang="id-ID" sz="1200" dirty="0" smtClean="0">
+            <a:pPr algn="ctr"/>
+            <a:r>
+              <a:rPr lang="en-ID" sz="1200" dirty="0" err="1" smtClean="0">
                 <a:latin typeface="Times New Roman" panose="02020603050405020304" pitchFamily="18" charset="0"/>
                 <a:cs typeface="Times New Roman" panose="02020603050405020304" pitchFamily="18" charset="0"/>
               </a:rPr>
-              <a:t>Studi Literatur</a:t>
-            </a:r>
-          </a:p>
-          <a:p>
-            <a:pPr marL="228600" indent="-228600">
-              <a:buAutoNum type="arabicPeriod"/>
-            </a:pPr>
-            <a:r>
-              <a:rPr lang="id-ID" sz="1200" dirty="0" smtClean="0">
-                <a:latin typeface="Times New Roman" panose="02020603050405020304" pitchFamily="18" charset="0"/>
-                <a:cs typeface="Times New Roman" panose="02020603050405020304" pitchFamily="18" charset="0"/>
-              </a:rPr>
-              <a:t>Natural Language Processing</a:t>
-            </a:r>
-          </a:p>
-          <a:p>
-            <a:pPr marL="228600" indent="-228600">
-              <a:buAutoNum type="arabicPeriod"/>
-            </a:pPr>
-            <a:r>
-              <a:rPr lang="id-ID" sz="1200" dirty="0" smtClean="0">
-                <a:latin typeface="Times New Roman" panose="02020603050405020304" pitchFamily="18" charset="0"/>
-                <a:cs typeface="Times New Roman" panose="02020603050405020304" pitchFamily="18" charset="0"/>
-              </a:rPr>
-              <a:t>Data-to-Text</a:t>
-            </a:r>
-            <a:endParaRPr lang="en-ID" sz="1200" dirty="0" smtClean="0">
-              <a:latin typeface="Times New Roman" panose="02020603050405020304" pitchFamily="18" charset="0"/>
-              <a:cs typeface="Times New Roman" panose="02020603050405020304" pitchFamily="18" charset="0"/>
-            </a:endParaRPr>
-          </a:p>
-          <a:p>
-            <a:pPr marL="228600" indent="-228600">
-              <a:buAutoNum type="arabicPeriod"/>
-            </a:pPr>
+              <a:t>Desain</a:t>
+            </a:r>
             <a:r>
               <a:rPr lang="en-ID" sz="1200" dirty="0" smtClean="0">
                 <a:latin typeface="Times New Roman" panose="02020603050405020304" pitchFamily="18" charset="0"/>
                 <a:cs typeface="Times New Roman" panose="02020603050405020304" pitchFamily="18" charset="0"/>
               </a:rPr>
-              <a:t>Statistical Analysis</a:t>
-            </a:r>
-            <a:endParaRPr lang="en-ID" sz="1200" dirty="0" smtClean="0">
-              <a:latin typeface="Times New Roman" panose="02020603050405020304" pitchFamily="18" charset="0"/>
-              <a:cs typeface="Times New Roman" panose="02020603050405020304" pitchFamily="18" charset="0"/>
-            </a:endParaRPr>
-          </a:p>
-          <a:p>
-            <a:pPr marL="228600" indent="-228600">
-              <a:buFontTx/>
-              <a:buAutoNum type="arabicPeriod"/>
-            </a:pPr>
-            <a:r>
-              <a:rPr lang="en-ID" sz="1200" dirty="0">
-                <a:latin typeface="Times New Roman" panose="02020603050405020304" pitchFamily="18" charset="0"/>
-                <a:cs typeface="Times New Roman" panose="02020603050405020304" pitchFamily="18" charset="0"/>
-              </a:rPr>
-              <a:t>Time Series </a:t>
-            </a:r>
-            <a:r>
-              <a:rPr lang="en-ID" sz="1200" dirty="0" smtClean="0">
-                <a:latin typeface="Times New Roman" panose="02020603050405020304" pitchFamily="18" charset="0"/>
-                <a:cs typeface="Times New Roman" panose="02020603050405020304" pitchFamily="18" charset="0"/>
-              </a:rPr>
-              <a:t>Analysis</a:t>
-            </a:r>
-          </a:p>
-          <a:p>
-            <a:pPr marL="228600" indent="-228600">
-              <a:buFontTx/>
-              <a:buAutoNum type="arabicPeriod"/>
-            </a:pPr>
-            <a:r>
-              <a:rPr lang="en-ID" sz="1200" dirty="0" smtClean="0">
-                <a:latin typeface="Times New Roman" panose="02020603050405020304" pitchFamily="18" charset="0"/>
-                <a:cs typeface="Times New Roman" panose="02020603050405020304" pitchFamily="18" charset="0"/>
-              </a:rPr>
-              <a:t>Exponential Smoothing</a:t>
-            </a:r>
-          </a:p>
-          <a:p>
-            <a:pPr marL="228600" indent="-228600">
-              <a:buFontTx/>
-              <a:buAutoNum type="arabicPeriod"/>
-            </a:pPr>
+              <a:t> </a:t>
+            </a:r>
             <a:r>
               <a:rPr lang="en-ID" sz="1200" dirty="0" err="1" smtClean="0">
                 <a:latin typeface="Times New Roman" panose="02020603050405020304" pitchFamily="18" charset="0"/>
                 <a:cs typeface="Times New Roman" panose="02020603050405020304" pitchFamily="18" charset="0"/>
               </a:rPr>
-              <a:t>Knutt</a:t>
-            </a:r>
-            <a:r>
-              <a:rPr lang="en-ID" sz="1200" dirty="0" smtClean="0">
-                <a:latin typeface="Times New Roman" panose="02020603050405020304" pitchFamily="18" charset="0"/>
-                <a:cs typeface="Times New Roman" panose="02020603050405020304" pitchFamily="18" charset="0"/>
-              </a:rPr>
-              <a:t>-Morris Pratt Algorithm</a:t>
+              <a:t>Eksperimen</a:t>
             </a:r>
             <a:endParaRPr lang="id-ID" sz="1200" dirty="0">
               <a:latin typeface="Times New Roman" panose="02020603050405020304" pitchFamily="18" charset="0"/>
               <a:cs typeface="Times New Roman" panose="02020603050405020304" pitchFamily="18" charset="0"/>
             </a:endParaRPr>
           </a:p>
-          <a:p>
-            <a:pPr marL="228600" indent="-228600">
-              <a:buAutoNum type="arabicPeriod"/>
-            </a:pPr>
-            <a:r>
-              <a:rPr lang="id-ID" sz="1200" dirty="0" smtClean="0">
-                <a:latin typeface="Times New Roman" panose="02020603050405020304" pitchFamily="18" charset="0"/>
-                <a:cs typeface="Times New Roman" panose="02020603050405020304" pitchFamily="18" charset="0"/>
-              </a:rPr>
-              <a:t>Machine </a:t>
-            </a:r>
-            <a:r>
-              <a:rPr lang="id-ID" sz="1200" dirty="0" smtClean="0">
-                <a:latin typeface="Times New Roman" panose="02020603050405020304" pitchFamily="18" charset="0"/>
-                <a:cs typeface="Times New Roman" panose="02020603050405020304" pitchFamily="18" charset="0"/>
-              </a:rPr>
-              <a:t>Learning</a:t>
-            </a:r>
-          </a:p>
-          <a:p>
-            <a:pPr marL="228600" indent="-228600">
-              <a:buAutoNum type="arabicPeriod"/>
-            </a:pPr>
-            <a:r>
-              <a:rPr lang="en-ID" sz="1200" dirty="0" smtClean="0">
-                <a:latin typeface="Times New Roman" panose="02020603050405020304" pitchFamily="18" charset="0"/>
-                <a:cs typeface="Times New Roman" panose="02020603050405020304" pitchFamily="18" charset="0"/>
-              </a:rPr>
-              <a:t>R Programming</a:t>
-            </a:r>
-            <a:endParaRPr lang="id-ID" sz="1200" dirty="0">
-              <a:latin typeface="Times New Roman" panose="02020603050405020304" pitchFamily="18" charset="0"/>
-              <a:cs typeface="Times New Roman" panose="02020603050405020304" pitchFamily="18" charset="0"/>
-            </a:endParaRPr>
-          </a:p>
-        </p:txBody>
-      </p:sp>
-      <p:sp>
-        <p:nvSpPr>
-          <p:cNvPr id="8" name="Rectangle 7"/>
+        </p:txBody>
+      </p:sp>
+      <p:sp>
+        <p:nvSpPr>
+          <p:cNvPr id="77" name="Rectangle 76"/>
           <p:cNvSpPr/>
           <p:nvPr/>
         </p:nvSpPr>
         <p:spPr>
           <a:xfrm>
-            <a:off x="0" y="4460039"/>
-            <a:ext cx="2580404" cy="1556363"/>
+            <a:off x="5335537" y="7031463"/>
+            <a:ext cx="2561292" cy="568893"/>
           </a:xfrm>
           <a:prstGeom prst="rect">
             <a:avLst/>
@@ -5597,14 +7150,14 @@
       </p:sp>
       <p:sp>
         <p:nvSpPr>
-          <p:cNvPr id="9" name="TextBox 8"/>
+          <p:cNvPr id="78" name="TextBox 77"/>
           <p:cNvSpPr txBox="1"/>
           <p:nvPr/>
         </p:nvSpPr>
         <p:spPr>
           <a:xfrm>
-            <a:off x="37720" y="4588316"/>
-            <a:ext cx="2542684" cy="907941"/>
+            <a:off x="5354145" y="7187121"/>
+            <a:ext cx="2542684" cy="276999"/>
           </a:xfrm>
           <a:prstGeom prst="rect">
             <a:avLst/>
@@ -5612,108 +7165,18 @@
           <a:noFill/>
         </p:spPr>
         <p:txBody>
-          <a:bodyPr wrap="none" rtlCol="0">
+          <a:bodyPr wrap="square" rtlCol="0">
             <a:spAutoFit/>
           </a:bodyPr>
           <a:lstStyle/>
           <a:p>
-            <a:pPr>
-              <a:spcAft>
-                <a:spcPts val="600"/>
-              </a:spcAft>
-            </a:pPr>
+            <a:pPr algn="ctr"/>
             <a:r>
               <a:rPr lang="en-ID" sz="1200" dirty="0" err="1" smtClean="0">
                 <a:latin typeface="Times New Roman" panose="02020603050405020304" pitchFamily="18" charset="0"/>
                 <a:cs typeface="Times New Roman" panose="02020603050405020304" pitchFamily="18" charset="0"/>
               </a:rPr>
-              <a:t>Pengumpulan</a:t>
-            </a:r>
-            <a:r>
-              <a:rPr lang="en-ID" sz="1200" dirty="0" smtClean="0">
-                <a:latin typeface="Times New Roman" panose="02020603050405020304" pitchFamily="18" charset="0"/>
-                <a:cs typeface="Times New Roman" panose="02020603050405020304" pitchFamily="18" charset="0"/>
-              </a:rPr>
-              <a:t> Data Time Series</a:t>
-            </a:r>
-            <a:endParaRPr lang="id-ID" sz="1200" dirty="0" smtClean="0">
-              <a:latin typeface="Times New Roman" panose="02020603050405020304" pitchFamily="18" charset="0"/>
-              <a:cs typeface="Times New Roman" panose="02020603050405020304" pitchFamily="18" charset="0"/>
-            </a:endParaRPr>
-          </a:p>
-          <a:p>
-            <a:pPr marL="228600" indent="-228600">
-              <a:buAutoNum type="arabicPeriod"/>
-            </a:pPr>
-            <a:r>
-              <a:rPr lang="en-ID" sz="1200" dirty="0" smtClean="0">
-                <a:latin typeface="Times New Roman" panose="02020603050405020304" pitchFamily="18" charset="0"/>
-                <a:cs typeface="Times New Roman" panose="02020603050405020304" pitchFamily="18" charset="0"/>
-              </a:rPr>
-              <a:t>Data </a:t>
-            </a:r>
-            <a:r>
-              <a:rPr lang="en-ID" sz="1200" dirty="0" err="1" smtClean="0">
-                <a:latin typeface="Times New Roman" panose="02020603050405020304" pitchFamily="18" charset="0"/>
-                <a:cs typeface="Times New Roman" panose="02020603050405020304" pitchFamily="18" charset="0"/>
-              </a:rPr>
-              <a:t>kurs</a:t>
-            </a:r>
-            <a:r>
-              <a:rPr lang="en-ID" sz="1200" dirty="0" smtClean="0">
-                <a:latin typeface="Times New Roman" panose="02020603050405020304" pitchFamily="18" charset="0"/>
-                <a:cs typeface="Times New Roman" panose="02020603050405020304" pitchFamily="18" charset="0"/>
-              </a:rPr>
-              <a:t> rupiah</a:t>
-            </a:r>
-          </a:p>
-          <a:p>
-            <a:pPr marL="228600" indent="-228600">
-              <a:buAutoNum type="arabicPeriod"/>
-            </a:pPr>
-            <a:r>
-              <a:rPr lang="en-ID" sz="1200" dirty="0" smtClean="0">
-                <a:latin typeface="Times New Roman" panose="02020603050405020304" pitchFamily="18" charset="0"/>
-                <a:cs typeface="Times New Roman" panose="02020603050405020304" pitchFamily="18" charset="0"/>
-              </a:rPr>
-              <a:t>Data </a:t>
-            </a:r>
-            <a:r>
-              <a:rPr lang="en-ID" sz="1200" dirty="0" err="1">
-                <a:latin typeface="Times New Roman" panose="02020603050405020304" pitchFamily="18" charset="0"/>
-                <a:cs typeface="Times New Roman" panose="02020603050405020304" pitchFamily="18" charset="0"/>
-              </a:rPr>
-              <a:t>k</a:t>
-            </a:r>
-            <a:r>
-              <a:rPr lang="en-ID" sz="1200" dirty="0" err="1" smtClean="0">
-                <a:latin typeface="Times New Roman" panose="02020603050405020304" pitchFamily="18" charset="0"/>
-                <a:cs typeface="Times New Roman" panose="02020603050405020304" pitchFamily="18" charset="0"/>
-              </a:rPr>
-              <a:t>limatologi</a:t>
-            </a:r>
-            <a:endParaRPr lang="en-ID" sz="1200" dirty="0" smtClean="0">
-              <a:latin typeface="Times New Roman" panose="02020603050405020304" pitchFamily="18" charset="0"/>
-              <a:cs typeface="Times New Roman" panose="02020603050405020304" pitchFamily="18" charset="0"/>
-            </a:endParaRPr>
-          </a:p>
-          <a:p>
-            <a:pPr marL="228600" indent="-228600">
-              <a:buAutoNum type="arabicPeriod"/>
-            </a:pPr>
-            <a:r>
-              <a:rPr lang="en-ID" sz="1200" dirty="0" smtClean="0">
-                <a:latin typeface="Times New Roman" panose="02020603050405020304" pitchFamily="18" charset="0"/>
-                <a:cs typeface="Times New Roman" panose="02020603050405020304" pitchFamily="18" charset="0"/>
-              </a:rPr>
-              <a:t>Data </a:t>
-            </a:r>
-            <a:r>
-              <a:rPr lang="en-ID" sz="1200" dirty="0" err="1" smtClean="0">
-                <a:latin typeface="Times New Roman" panose="02020603050405020304" pitchFamily="18" charset="0"/>
-                <a:cs typeface="Times New Roman" panose="02020603050405020304" pitchFamily="18" charset="0"/>
-              </a:rPr>
-              <a:t>sinar</a:t>
+              <a:t>Penarikan</a:t>
             </a:r>
             <a:r>
               <a:rPr lang="en-ID" sz="1200" dirty="0" smtClean="0">
@@ -5727,117 +7190,7 @@
                 <a:latin typeface="Times New Roman" panose="02020603050405020304" pitchFamily="18" charset="0"/>
                 <a:cs typeface="Times New Roman" panose="02020603050405020304" pitchFamily="18" charset="0"/>
               </a:rPr>
-              <a:t>radiasi</a:t>
-            </a:r>
-            <a:r>
-              <a:rPr lang="en-ID" sz="1200" dirty="0" smtClean="0">
-                <a:latin typeface="Times New Roman" panose="02020603050405020304" pitchFamily="18" charset="0"/>
-                <a:cs typeface="Times New Roman" panose="02020603050405020304" pitchFamily="18" charset="0"/>
-              </a:rPr>
-              <a:t> </a:t>
-            </a:r>
-            <a:r>
-              <a:rPr lang="en-ID" sz="1200" dirty="0" err="1" smtClean="0">
-                <a:latin typeface="Times New Roman" panose="02020603050405020304" pitchFamily="18" charset="0"/>
-                <a:cs typeface="Times New Roman" panose="02020603050405020304" pitchFamily="18" charset="0"/>
-              </a:rPr>
-              <a:t>dan</a:t>
-            </a:r>
-            <a:r>
-              <a:rPr lang="en-ID" sz="1200" dirty="0" smtClean="0">
-                <a:latin typeface="Times New Roman" panose="02020603050405020304" pitchFamily="18" charset="0"/>
-                <a:cs typeface="Times New Roman" panose="02020603050405020304" pitchFamily="18" charset="0"/>
-              </a:rPr>
-              <a:t> </a:t>
-            </a:r>
-            <a:r>
-              <a:rPr lang="en-ID" sz="1200" dirty="0" err="1" smtClean="0">
-                <a:latin typeface="Times New Roman" panose="02020603050405020304" pitchFamily="18" charset="0"/>
-                <a:cs typeface="Times New Roman" panose="02020603050405020304" pitchFamily="18" charset="0"/>
-              </a:rPr>
-              <a:t>meteorologi</a:t>
-            </a:r>
-            <a:endParaRPr lang="en-ID" sz="1200" dirty="0" smtClean="0">
-              <a:latin typeface="Times New Roman" panose="02020603050405020304" pitchFamily="18" charset="0"/>
-              <a:cs typeface="Times New Roman" panose="02020603050405020304" pitchFamily="18" charset="0"/>
-            </a:endParaRPr>
-          </a:p>
-        </p:txBody>
-      </p:sp>
-      <p:sp>
-        <p:nvSpPr>
-          <p:cNvPr id="10" name="Rectangle 9"/>
-          <p:cNvSpPr/>
-          <p:nvPr/>
-        </p:nvSpPr>
-        <p:spPr>
-          <a:xfrm>
-            <a:off x="2898430" y="75369"/>
-            <a:ext cx="7844704" cy="8094156"/>
-          </a:xfrm>
-          <a:prstGeom prst="rect">
-            <a:avLst/>
-          </a:prstGeom>
-          <a:noFill/>
-          <a:ln w="12700">
-            <a:solidFill>
-              <a:schemeClr val="tx1"/>
-            </a:solidFill>
-            <a:prstDash val="solid"/>
-          </a:ln>
-        </p:spPr>
-        <p:style>
-          <a:lnRef idx="2">
-            <a:schemeClr val="accent6"/>
-          </a:lnRef>
-          <a:fillRef idx="1">
-            <a:schemeClr val="lt1"/>
-          </a:fillRef>
-          <a:effectRef idx="0">
-            <a:schemeClr val="accent6"/>
-          </a:effectRef>
-          <a:fontRef idx="minor">
-            <a:schemeClr val="dk1"/>
-          </a:fontRef>
-        </p:style>
-        <p:txBody>
-          <a:bodyPr rtlCol="0" anchor="ctr"/>
-          <a:lstStyle/>
-          <a:p>
-            <a:pPr algn="ctr"/>
-            <a:endParaRPr lang="id-ID"/>
-          </a:p>
-        </p:txBody>
-      </p:sp>
-      <p:sp>
-        <p:nvSpPr>
-          <p:cNvPr id="12" name="TextBox 11"/>
-          <p:cNvSpPr txBox="1"/>
-          <p:nvPr/>
-        </p:nvSpPr>
-        <p:spPr>
-          <a:xfrm>
-            <a:off x="3039369" y="453859"/>
-            <a:ext cx="2431141" cy="276999"/>
-          </a:xfrm>
-          <a:prstGeom prst="rect">
-            <a:avLst/>
-          </a:prstGeom>
-          <a:noFill/>
-        </p:spPr>
-        <p:txBody>
-          <a:bodyPr wrap="square" rtlCol="0">
-            <a:spAutoFit/>
-          </a:bodyPr>
-          <a:lstStyle/>
-          <a:p>
-            <a:pPr algn="ctr"/>
-            <a:r>
-              <a:rPr lang="en-ID" sz="1200" dirty="0" smtClean="0">
-                <a:latin typeface="Times New Roman" panose="02020603050405020304" pitchFamily="18" charset="0"/>
-                <a:cs typeface="Times New Roman" panose="02020603050405020304" pitchFamily="18" charset="0"/>
-              </a:rPr>
-              <a:t>Data</a:t>
+              <a:t>Kesimpulan</a:t>
             </a:r>
             <a:endParaRPr lang="id-ID" sz="1200" dirty="0">
               <a:latin typeface="Times New Roman" panose="02020603050405020304" pitchFamily="18" charset="0"/>
@@ -5848,14 +7201,14 @@
       </p:sp>
       <p:sp>
         <p:nvSpPr>
-          <p:cNvPr id="15" name="Rectangle 14"/>
+          <p:cNvPr id="82" name="Rectangle 81"/>
           <p:cNvSpPr/>
           <p:nvPr/>
         </p:nvSpPr>
         <p:spPr>
           <a:xfrm>
-            <a:off x="3213260" y="1020668"/>
-            <a:ext cx="2104570" cy="1654180"/>
+            <a:off x="5335537" y="8535117"/>
+            <a:ext cx="2561292" cy="568893"/>
           </a:xfrm>
           <a:prstGeom prst="rect">
             <a:avLst/>
@@ -5897,14 +7250,14 @@
       </p:sp>
       <p:sp>
         <p:nvSpPr>
-          <p:cNvPr id="16" name="TextBox 15"/>
+          <p:cNvPr id="83" name="TextBox 82"/>
           <p:cNvSpPr txBox="1"/>
           <p:nvPr/>
         </p:nvSpPr>
         <p:spPr>
           <a:xfrm>
-            <a:off x="3213260" y="1166951"/>
-            <a:ext cx="2098304" cy="1831271"/>
+            <a:off x="5335537" y="8681064"/>
+            <a:ext cx="2542684" cy="276999"/>
           </a:xfrm>
           <a:prstGeom prst="rect">
             <a:avLst/>
@@ -5917,133 +7270,45 @@
           </a:bodyPr>
           <a:lstStyle/>
           <a:p>
-            <a:pPr>
-              <a:spcAft>
-                <a:spcPts val="600"/>
-              </a:spcAft>
-            </a:pPr>
+            <a:pPr algn="ctr"/>
+            <a:r>
+              <a:rPr lang="en-ID" sz="1200" dirty="0" err="1" smtClean="0">
+                <a:latin typeface="Times New Roman" panose="02020603050405020304" pitchFamily="18" charset="0"/>
+                <a:cs typeface="Times New Roman" panose="02020603050405020304" pitchFamily="18" charset="0"/>
+              </a:rPr>
+              <a:t>Hasil</a:t>
+            </a:r>
             <a:r>
               <a:rPr lang="en-ID" sz="1200" dirty="0" smtClean="0">
                 <a:latin typeface="Times New Roman" panose="02020603050405020304" pitchFamily="18" charset="0"/>
                 <a:cs typeface="Times New Roman" panose="02020603050405020304" pitchFamily="18" charset="0"/>
               </a:rPr>
-              <a:t>Signal Analysis</a:t>
-            </a:r>
-            <a:r>
-              <a:rPr lang="id-ID" sz="1200" dirty="0" smtClean="0">
+              <a:t> </a:t>
+            </a:r>
+            <a:r>
+              <a:rPr lang="en-ID" sz="1200" dirty="0" err="1" smtClean="0">
                 <a:latin typeface="Times New Roman" panose="02020603050405020304" pitchFamily="18" charset="0"/>
                 <a:cs typeface="Times New Roman" panose="02020603050405020304" pitchFamily="18" charset="0"/>
               </a:rPr>
-              <a:t>:</a:t>
+              <a:t>Eksperimen</a:t>
             </a:r>
             <a:endParaRPr lang="id-ID" sz="1200" dirty="0">
               <a:latin typeface="Times New Roman" panose="02020603050405020304" pitchFamily="18" charset="0"/>
               <a:cs typeface="Times New Roman" panose="02020603050405020304" pitchFamily="18" charset="0"/>
             </a:endParaRPr>
           </a:p>
-          <a:p>
-            <a:pPr marL="228600" indent="-228600">
-              <a:buFont typeface="+mj-lt"/>
-              <a:buAutoNum type="arabicPeriod"/>
-            </a:pPr>
-            <a:r>
-              <a:rPr lang="en-ID" sz="1200" dirty="0" smtClean="0">
-                <a:latin typeface="Times New Roman" panose="02020603050405020304" pitchFamily="18" charset="0"/>
-                <a:cs typeface="Times New Roman" panose="02020603050405020304" pitchFamily="18" charset="0"/>
-              </a:rPr>
-              <a:t>Header Detection</a:t>
-            </a:r>
-          </a:p>
-          <a:p>
-            <a:pPr marL="228600" indent="-228600">
-              <a:buAutoNum type="arabicPeriod"/>
-            </a:pPr>
-            <a:r>
-              <a:rPr lang="en-ID" sz="1200" dirty="0" smtClean="0">
-                <a:latin typeface="Times New Roman" panose="02020603050405020304" pitchFamily="18" charset="0"/>
-                <a:cs typeface="Times New Roman" panose="02020603050405020304" pitchFamily="18" charset="0"/>
-              </a:rPr>
-              <a:t>Date Interval</a:t>
-            </a:r>
-          </a:p>
-          <a:p>
-            <a:pPr marL="228600" indent="-228600">
-              <a:buAutoNum type="arabicPeriod"/>
-            </a:pPr>
-            <a:r>
-              <a:rPr lang="en-ID" sz="1200" dirty="0" smtClean="0">
-                <a:latin typeface="Times New Roman" panose="02020603050405020304" pitchFamily="18" charset="0"/>
-                <a:cs typeface="Times New Roman" panose="02020603050405020304" pitchFamily="18" charset="0"/>
-              </a:rPr>
-              <a:t>Missing Value Handling</a:t>
-            </a:r>
-          </a:p>
-          <a:p>
-            <a:pPr marL="228600" indent="-228600">
-              <a:buAutoNum type="arabicPeriod"/>
-            </a:pPr>
-            <a:r>
-              <a:rPr lang="en-ID" sz="1200" dirty="0" smtClean="0">
-                <a:latin typeface="Times New Roman" panose="02020603050405020304" pitchFamily="18" charset="0"/>
-                <a:cs typeface="Times New Roman" panose="02020603050405020304" pitchFamily="18" charset="0"/>
-              </a:rPr>
-              <a:t>Statistical Analysis</a:t>
-            </a:r>
-          </a:p>
-          <a:p>
-            <a:pPr marL="228600" indent="-228600">
-              <a:buAutoNum type="arabicPeriod"/>
-            </a:pPr>
-            <a:r>
-              <a:rPr lang="en-ID" sz="1200" dirty="0" smtClean="0">
-                <a:latin typeface="Times New Roman" panose="02020603050405020304" pitchFamily="18" charset="0"/>
-                <a:cs typeface="Times New Roman" panose="02020603050405020304" pitchFamily="18" charset="0"/>
-              </a:rPr>
-              <a:t>Linear Regression</a:t>
-            </a:r>
-          </a:p>
-          <a:p>
-            <a:pPr marL="228600" indent="-228600">
-              <a:buAutoNum type="arabicPeriod"/>
-            </a:pPr>
-            <a:r>
-              <a:rPr lang="en-ID" sz="1200" dirty="0" smtClean="0">
-                <a:latin typeface="Times New Roman" panose="02020603050405020304" pitchFamily="18" charset="0"/>
-                <a:cs typeface="Times New Roman" panose="02020603050405020304" pitchFamily="18" charset="0"/>
-              </a:rPr>
-              <a:t>Knuth Morris Pratt</a:t>
-            </a:r>
-          </a:p>
-          <a:p>
-            <a:pPr marL="228600" indent="-228600">
-              <a:buAutoNum type="arabicPeriod"/>
-            </a:pPr>
-            <a:endParaRPr lang="en-ID" sz="1200" dirty="0" smtClean="0">
-              <a:latin typeface="Times New Roman" panose="02020603050405020304" pitchFamily="18" charset="0"/>
-              <a:cs typeface="Times New Roman" panose="02020603050405020304" pitchFamily="18" charset="0"/>
-            </a:endParaRPr>
-          </a:p>
-          <a:p>
-            <a:pPr marL="228600" indent="-228600">
-              <a:buAutoNum type="arabicPeriod"/>
-            </a:pPr>
-            <a:endParaRPr lang="en-ID" sz="1200" dirty="0" smtClean="0">
-              <a:latin typeface="Times New Roman" panose="02020603050405020304" pitchFamily="18" charset="0"/>
-              <a:cs typeface="Times New Roman" panose="02020603050405020304" pitchFamily="18" charset="0"/>
-            </a:endParaRPr>
-          </a:p>
-        </p:txBody>
-      </p:sp>
-      <p:sp>
-        <p:nvSpPr>
-          <p:cNvPr id="17" name="Rectangle 16"/>
+        </p:txBody>
+      </p:sp>
+      <p:sp>
+        <p:nvSpPr>
+          <p:cNvPr id="84" name="Rectangle 83"/>
           <p:cNvSpPr/>
           <p:nvPr/>
         </p:nvSpPr>
         <p:spPr>
           <a:xfrm>
-            <a:off x="3206001" y="2900564"/>
-            <a:ext cx="2104570" cy="1926929"/>
+            <a:off x="2511377" y="9330480"/>
+            <a:ext cx="2561292" cy="568893"/>
           </a:xfrm>
           <a:prstGeom prst="rect">
             <a:avLst/>
@@ -6085,14 +7350,14 @@
       </p:sp>
       <p:sp>
         <p:nvSpPr>
-          <p:cNvPr id="18" name="TextBox 17"/>
+          <p:cNvPr id="85" name="TextBox 84"/>
           <p:cNvSpPr txBox="1"/>
           <p:nvPr/>
         </p:nvSpPr>
         <p:spPr>
           <a:xfrm>
-            <a:off x="3206001" y="3046848"/>
-            <a:ext cx="2098304" cy="538609"/>
+            <a:off x="2511377" y="9466303"/>
+            <a:ext cx="2542684" cy="276999"/>
           </a:xfrm>
           <a:prstGeom prst="rect">
             <a:avLst/>
@@ -6105,698 +7370,35 @@
           </a:bodyPr>
           <a:lstStyle/>
           <a:p>
-            <a:pPr>
-              <a:spcAft>
-                <a:spcPts val="600"/>
-              </a:spcAft>
-            </a:pPr>
+            <a:pPr algn="ctr"/>
+            <a:r>
+              <a:rPr lang="en-ID" sz="1200" dirty="0" err="1" smtClean="0">
+                <a:latin typeface="Times New Roman" panose="02020603050405020304" pitchFamily="18" charset="0"/>
+                <a:cs typeface="Times New Roman" panose="02020603050405020304" pitchFamily="18" charset="0"/>
+              </a:rPr>
+              <a:t>Desain</a:t>
+            </a:r>
             <a:r>
               <a:rPr lang="en-ID" sz="1200" dirty="0" smtClean="0">
                 <a:latin typeface="Times New Roman" panose="02020603050405020304" pitchFamily="18" charset="0"/>
                 <a:cs typeface="Times New Roman" panose="02020603050405020304" pitchFamily="18" charset="0"/>
               </a:rPr>
-              <a:t>Data Interpretation</a:t>
-            </a:r>
-            <a:r>
-              <a:rPr lang="id-ID" sz="1200" dirty="0" smtClean="0">
+              <a:t> </a:t>
+            </a:r>
+            <a:r>
+              <a:rPr lang="en-ID" sz="1200" dirty="0" err="1" smtClean="0">
                 <a:latin typeface="Times New Roman" panose="02020603050405020304" pitchFamily="18" charset="0"/>
                 <a:cs typeface="Times New Roman" panose="02020603050405020304" pitchFamily="18" charset="0"/>
               </a:rPr>
-              <a:t>:</a:t>
+              <a:t>Eksperimen</a:t>
             </a:r>
             <a:endParaRPr lang="id-ID" sz="1200" dirty="0">
               <a:latin typeface="Times New Roman" panose="02020603050405020304" pitchFamily="18" charset="0"/>
               <a:cs typeface="Times New Roman" panose="02020603050405020304" pitchFamily="18" charset="0"/>
             </a:endParaRPr>
           </a:p>
-          <a:p>
-            <a:r>
-              <a:rPr lang="en-ID" sz="1200" dirty="0" smtClean="0">
-                <a:latin typeface="Times New Roman" panose="02020603050405020304" pitchFamily="18" charset="0"/>
-                <a:cs typeface="Times New Roman" panose="02020603050405020304" pitchFamily="18" charset="0"/>
-              </a:rPr>
-              <a:t>1. </a:t>
-            </a:r>
-            <a:endParaRPr lang="id-ID" sz="1200" dirty="0">
-              <a:latin typeface="Times New Roman" panose="02020603050405020304" pitchFamily="18" charset="0"/>
-              <a:cs typeface="Times New Roman" panose="02020603050405020304" pitchFamily="18" charset="0"/>
-            </a:endParaRPr>
-          </a:p>
-        </p:txBody>
-      </p:sp>
-      <p:sp>
-        <p:nvSpPr>
-          <p:cNvPr id="19" name="Rectangle 18"/>
-          <p:cNvSpPr/>
-          <p:nvPr/>
-        </p:nvSpPr>
-        <p:spPr>
-          <a:xfrm>
-            <a:off x="3341846" y="6114479"/>
-            <a:ext cx="2104570" cy="544076"/>
-          </a:xfrm>
-          <a:prstGeom prst="rect">
-            <a:avLst/>
-          </a:prstGeom>
-          <a:noFill/>
-          <a:ln>
-            <a:solidFill>
-              <a:schemeClr val="tx1"/>
-            </a:solidFill>
-          </a:ln>
-        </p:spPr>
-        <p:style>
-          <a:lnRef idx="2">
-            <a:schemeClr val="accent1">
-              <a:shade val="50000"/>
-            </a:schemeClr>
-          </a:lnRef>
-          <a:fillRef idx="1">
-            <a:schemeClr val="accent1"/>
-          </a:fillRef>
-          <a:effectRef idx="0">
-            <a:schemeClr val="accent1"/>
-          </a:effectRef>
-          <a:fontRef idx="minor">
-            <a:schemeClr val="lt1"/>
-          </a:fontRef>
-        </p:style>
-        <p:txBody>
-          <a:bodyPr rtlCol="0" anchor="ctr"/>
-          <a:lstStyle/>
-          <a:p>
-            <a:pPr algn="ctr"/>
-            <a:endParaRPr lang="id-ID" sz="1200">
-              <a:latin typeface="Times New Roman" panose="02020603050405020304" pitchFamily="18" charset="0"/>
-              <a:cs typeface="Times New Roman" panose="02020603050405020304" pitchFamily="18" charset="0"/>
-            </a:endParaRPr>
-          </a:p>
-        </p:txBody>
-      </p:sp>
-      <p:sp>
-        <p:nvSpPr>
-          <p:cNvPr id="20" name="TextBox 19"/>
-          <p:cNvSpPr txBox="1"/>
-          <p:nvPr/>
-        </p:nvSpPr>
-        <p:spPr>
-          <a:xfrm>
-            <a:off x="3341846" y="6260762"/>
-            <a:ext cx="2098304" cy="276999"/>
-          </a:xfrm>
-          <a:prstGeom prst="rect">
-            <a:avLst/>
-          </a:prstGeom>
-          <a:noFill/>
-        </p:spPr>
-        <p:txBody>
-          <a:bodyPr wrap="square" rtlCol="0">
-            <a:spAutoFit/>
-          </a:bodyPr>
-          <a:lstStyle/>
-          <a:p>
-            <a:pPr algn="ctr"/>
-            <a:r>
-              <a:rPr lang="id-ID" sz="1200" dirty="0" smtClean="0">
-                <a:latin typeface="Times New Roman" panose="02020603050405020304" pitchFamily="18" charset="0"/>
-                <a:cs typeface="Times New Roman" panose="02020603050405020304" pitchFamily="18" charset="0"/>
-              </a:rPr>
-              <a:t>Document Planning</a:t>
-            </a:r>
-            <a:endParaRPr lang="id-ID" sz="1200" dirty="0">
-              <a:latin typeface="Times New Roman" panose="02020603050405020304" pitchFamily="18" charset="0"/>
-              <a:cs typeface="Times New Roman" panose="02020603050405020304" pitchFamily="18" charset="0"/>
-            </a:endParaRPr>
-          </a:p>
-        </p:txBody>
-      </p:sp>
-      <p:sp>
-        <p:nvSpPr>
-          <p:cNvPr id="21" name="Rectangle 20"/>
-          <p:cNvSpPr/>
-          <p:nvPr/>
-        </p:nvSpPr>
-        <p:spPr>
-          <a:xfrm>
-            <a:off x="7650499" y="1187070"/>
-            <a:ext cx="2438401" cy="630378"/>
-          </a:xfrm>
-          <a:prstGeom prst="rect">
-            <a:avLst/>
-          </a:prstGeom>
-          <a:noFill/>
-          <a:ln>
-            <a:solidFill>
-              <a:schemeClr val="tx1"/>
-            </a:solidFill>
-          </a:ln>
-        </p:spPr>
-        <p:style>
-          <a:lnRef idx="2">
-            <a:schemeClr val="accent1">
-              <a:shade val="50000"/>
-            </a:schemeClr>
-          </a:lnRef>
-          <a:fillRef idx="1">
-            <a:schemeClr val="accent1"/>
-          </a:fillRef>
-          <a:effectRef idx="0">
-            <a:schemeClr val="accent1"/>
-          </a:effectRef>
-          <a:fontRef idx="minor">
-            <a:schemeClr val="lt1"/>
-          </a:fontRef>
-        </p:style>
-        <p:txBody>
-          <a:bodyPr rtlCol="0" anchor="ctr"/>
-          <a:lstStyle/>
-          <a:p>
-            <a:pPr algn="ctr"/>
-            <a:endParaRPr lang="id-ID" sz="1200">
-              <a:latin typeface="Times New Roman" panose="02020603050405020304" pitchFamily="18" charset="0"/>
-              <a:cs typeface="Times New Roman" panose="02020603050405020304" pitchFamily="18" charset="0"/>
-            </a:endParaRPr>
-          </a:p>
-        </p:txBody>
-      </p:sp>
-      <p:sp>
-        <p:nvSpPr>
-          <p:cNvPr id="22" name="TextBox 21"/>
-          <p:cNvSpPr txBox="1"/>
-          <p:nvPr/>
-        </p:nvSpPr>
-        <p:spPr>
-          <a:xfrm>
-            <a:off x="7650499" y="1376894"/>
-            <a:ext cx="2431141" cy="276999"/>
-          </a:xfrm>
-          <a:prstGeom prst="rect">
-            <a:avLst/>
-          </a:prstGeom>
-          <a:noFill/>
-        </p:spPr>
-        <p:txBody>
-          <a:bodyPr wrap="square" rtlCol="0">
-            <a:spAutoFit/>
-          </a:bodyPr>
-          <a:lstStyle/>
-          <a:p>
-            <a:pPr algn="ctr"/>
-            <a:r>
-              <a:rPr lang="id-ID" sz="1200" dirty="0" smtClean="0">
-                <a:latin typeface="Times New Roman" panose="02020603050405020304" pitchFamily="18" charset="0"/>
-                <a:cs typeface="Times New Roman" panose="02020603050405020304" pitchFamily="18" charset="0"/>
-              </a:rPr>
-              <a:t>Testing</a:t>
-            </a:r>
-            <a:endParaRPr lang="id-ID" sz="1200" dirty="0">
-              <a:latin typeface="Times New Roman" panose="02020603050405020304" pitchFamily="18" charset="0"/>
-              <a:cs typeface="Times New Roman" panose="02020603050405020304" pitchFamily="18" charset="0"/>
-            </a:endParaRPr>
-          </a:p>
-        </p:txBody>
-      </p:sp>
-      <p:sp>
-        <p:nvSpPr>
-          <p:cNvPr id="23" name="Rectangle 22"/>
-          <p:cNvSpPr/>
-          <p:nvPr/>
-        </p:nvSpPr>
-        <p:spPr>
-          <a:xfrm>
-            <a:off x="7643239" y="2007272"/>
-            <a:ext cx="2438401" cy="630378"/>
-          </a:xfrm>
-          <a:prstGeom prst="rect">
-            <a:avLst/>
-          </a:prstGeom>
-          <a:noFill/>
-          <a:ln>
-            <a:solidFill>
-              <a:schemeClr val="tx1"/>
-            </a:solidFill>
-          </a:ln>
-        </p:spPr>
-        <p:style>
-          <a:lnRef idx="2">
-            <a:schemeClr val="accent1">
-              <a:shade val="50000"/>
-            </a:schemeClr>
-          </a:lnRef>
-          <a:fillRef idx="1">
-            <a:schemeClr val="accent1"/>
-          </a:fillRef>
-          <a:effectRef idx="0">
-            <a:schemeClr val="accent1"/>
-          </a:effectRef>
-          <a:fontRef idx="minor">
-            <a:schemeClr val="lt1"/>
-          </a:fontRef>
-        </p:style>
-        <p:txBody>
-          <a:bodyPr rtlCol="0" anchor="ctr"/>
-          <a:lstStyle/>
-          <a:p>
-            <a:pPr algn="ctr"/>
-            <a:endParaRPr lang="id-ID" sz="1200">
-              <a:latin typeface="Times New Roman" panose="02020603050405020304" pitchFamily="18" charset="0"/>
-              <a:cs typeface="Times New Roman" panose="02020603050405020304" pitchFamily="18" charset="0"/>
-            </a:endParaRPr>
-          </a:p>
-        </p:txBody>
-      </p:sp>
-      <p:sp>
-        <p:nvSpPr>
-          <p:cNvPr id="24" name="TextBox 23"/>
-          <p:cNvSpPr txBox="1"/>
-          <p:nvPr/>
-        </p:nvSpPr>
-        <p:spPr>
-          <a:xfrm>
-            <a:off x="7643239" y="2197096"/>
-            <a:ext cx="2431141" cy="276999"/>
-          </a:xfrm>
-          <a:prstGeom prst="rect">
-            <a:avLst/>
-          </a:prstGeom>
-          <a:noFill/>
-        </p:spPr>
-        <p:txBody>
-          <a:bodyPr wrap="square" rtlCol="0">
-            <a:spAutoFit/>
-          </a:bodyPr>
-          <a:lstStyle/>
-          <a:p>
-            <a:pPr algn="ctr"/>
-            <a:r>
-              <a:rPr lang="id-ID" sz="1200" dirty="0" smtClean="0">
-                <a:latin typeface="Times New Roman" panose="02020603050405020304" pitchFamily="18" charset="0"/>
-                <a:cs typeface="Times New Roman" panose="02020603050405020304" pitchFamily="18" charset="0"/>
-              </a:rPr>
-              <a:t>Deployment</a:t>
-            </a:r>
-            <a:endParaRPr lang="id-ID" sz="1200" dirty="0">
-              <a:latin typeface="Times New Roman" panose="02020603050405020304" pitchFamily="18" charset="0"/>
-              <a:cs typeface="Times New Roman" panose="02020603050405020304" pitchFamily="18" charset="0"/>
-            </a:endParaRPr>
-          </a:p>
-        </p:txBody>
-      </p:sp>
-      <p:sp>
-        <p:nvSpPr>
-          <p:cNvPr id="25" name="Rectangle 24"/>
-          <p:cNvSpPr/>
-          <p:nvPr/>
-        </p:nvSpPr>
-        <p:spPr>
-          <a:xfrm>
-            <a:off x="7650499" y="2790012"/>
-            <a:ext cx="2438401" cy="630378"/>
-          </a:xfrm>
-          <a:prstGeom prst="rect">
-            <a:avLst/>
-          </a:prstGeom>
-          <a:noFill/>
-          <a:ln>
-            <a:solidFill>
-              <a:schemeClr val="tx1"/>
-            </a:solidFill>
-          </a:ln>
-        </p:spPr>
-        <p:style>
-          <a:lnRef idx="2">
-            <a:schemeClr val="accent1">
-              <a:shade val="50000"/>
-            </a:schemeClr>
-          </a:lnRef>
-          <a:fillRef idx="1">
-            <a:schemeClr val="accent1"/>
-          </a:fillRef>
-          <a:effectRef idx="0">
-            <a:schemeClr val="accent1"/>
-          </a:effectRef>
-          <a:fontRef idx="minor">
-            <a:schemeClr val="lt1"/>
-          </a:fontRef>
-        </p:style>
-        <p:txBody>
-          <a:bodyPr rtlCol="0" anchor="ctr"/>
-          <a:lstStyle/>
-          <a:p>
-            <a:pPr algn="ctr"/>
-            <a:endParaRPr lang="id-ID" sz="1200">
-              <a:latin typeface="Times New Roman" panose="02020603050405020304" pitchFamily="18" charset="0"/>
-              <a:cs typeface="Times New Roman" panose="02020603050405020304" pitchFamily="18" charset="0"/>
-            </a:endParaRPr>
-          </a:p>
-        </p:txBody>
-      </p:sp>
-      <p:sp>
-        <p:nvSpPr>
-          <p:cNvPr id="26" name="TextBox 25"/>
-          <p:cNvSpPr txBox="1"/>
-          <p:nvPr/>
-        </p:nvSpPr>
-        <p:spPr>
-          <a:xfrm>
-            <a:off x="7650499" y="2979836"/>
-            <a:ext cx="2431141" cy="276999"/>
-          </a:xfrm>
-          <a:prstGeom prst="rect">
-            <a:avLst/>
-          </a:prstGeom>
-          <a:noFill/>
-        </p:spPr>
-        <p:txBody>
-          <a:bodyPr wrap="square" rtlCol="0">
-            <a:spAutoFit/>
-          </a:bodyPr>
-          <a:lstStyle/>
-          <a:p>
-            <a:pPr algn="ctr"/>
-            <a:r>
-              <a:rPr lang="id-ID" sz="1200" dirty="0" smtClean="0">
-                <a:latin typeface="Times New Roman" panose="02020603050405020304" pitchFamily="18" charset="0"/>
-                <a:cs typeface="Times New Roman" panose="02020603050405020304" pitchFamily="18" charset="0"/>
-              </a:rPr>
-              <a:t>Maintenance</a:t>
-            </a:r>
-            <a:endParaRPr lang="id-ID" sz="1200" dirty="0">
-              <a:latin typeface="Times New Roman" panose="02020603050405020304" pitchFamily="18" charset="0"/>
-              <a:cs typeface="Times New Roman" panose="02020603050405020304" pitchFamily="18" charset="0"/>
-            </a:endParaRPr>
-          </a:p>
-        </p:txBody>
-      </p:sp>
-      <p:sp>
-        <p:nvSpPr>
-          <p:cNvPr id="27" name="TextBox 26"/>
-          <p:cNvSpPr txBox="1"/>
-          <p:nvPr/>
-        </p:nvSpPr>
-        <p:spPr>
-          <a:xfrm>
-            <a:off x="1815352" y="86042"/>
-            <a:ext cx="5674659" cy="276999"/>
-          </a:xfrm>
-          <a:prstGeom prst="rect">
-            <a:avLst/>
-          </a:prstGeom>
-          <a:noFill/>
-        </p:spPr>
-        <p:txBody>
-          <a:bodyPr wrap="square" rtlCol="0">
-            <a:spAutoFit/>
-          </a:bodyPr>
-          <a:lstStyle/>
-          <a:p>
-            <a:pPr algn="ctr"/>
-            <a:r>
-              <a:rPr lang="en-ID" sz="1200" dirty="0" err="1" smtClean="0">
-                <a:latin typeface="Times New Roman" panose="02020603050405020304" pitchFamily="18" charset="0"/>
-                <a:cs typeface="Times New Roman" panose="02020603050405020304" pitchFamily="18" charset="0"/>
-              </a:rPr>
-              <a:t>Pengembangan</a:t>
-            </a:r>
-            <a:r>
-              <a:rPr lang="en-ID" sz="1200" dirty="0" smtClean="0">
-                <a:latin typeface="Times New Roman" panose="02020603050405020304" pitchFamily="18" charset="0"/>
-                <a:cs typeface="Times New Roman" panose="02020603050405020304" pitchFamily="18" charset="0"/>
-              </a:rPr>
-              <a:t> Model D2T </a:t>
-            </a:r>
-            <a:r>
-              <a:rPr lang="en-ID" sz="1200" dirty="0" err="1" smtClean="0">
-                <a:latin typeface="Times New Roman" panose="02020603050405020304" pitchFamily="18" charset="0"/>
-                <a:cs typeface="Times New Roman" panose="02020603050405020304" pitchFamily="18" charset="0"/>
-              </a:rPr>
-              <a:t>untuk</a:t>
-            </a:r>
-            <a:r>
-              <a:rPr lang="en-ID" sz="1200" dirty="0" smtClean="0">
-                <a:latin typeface="Times New Roman" panose="02020603050405020304" pitchFamily="18" charset="0"/>
-                <a:cs typeface="Times New Roman" panose="02020603050405020304" pitchFamily="18" charset="0"/>
-              </a:rPr>
-              <a:t> Data General</a:t>
-            </a:r>
-            <a:endParaRPr lang="id-ID" sz="1200" dirty="0">
-              <a:latin typeface="Times New Roman" panose="02020603050405020304" pitchFamily="18" charset="0"/>
-              <a:cs typeface="Times New Roman" panose="02020603050405020304" pitchFamily="18" charset="0"/>
-            </a:endParaRPr>
-          </a:p>
-        </p:txBody>
-      </p:sp>
-      <p:cxnSp>
-        <p:nvCxnSpPr>
-          <p:cNvPr id="30" name="Straight Arrow Connector 29"/>
-          <p:cNvCxnSpPr/>
-          <p:nvPr/>
-        </p:nvCxnSpPr>
-        <p:spPr>
-          <a:xfrm>
-            <a:off x="4258286" y="787588"/>
-            <a:ext cx="0" cy="223062"/>
-          </a:xfrm>
-          <a:prstGeom prst="straightConnector1">
-            <a:avLst/>
-          </a:prstGeom>
-          <a:ln>
-            <a:tailEnd type="triangle"/>
-          </a:ln>
-        </p:spPr>
-        <p:style>
-          <a:lnRef idx="1">
-            <a:schemeClr val="dk1"/>
-          </a:lnRef>
-          <a:fillRef idx="0">
-            <a:schemeClr val="dk1"/>
-          </a:fillRef>
-          <a:effectRef idx="0">
-            <a:schemeClr val="dk1"/>
-          </a:effectRef>
-          <a:fontRef idx="minor">
-            <a:schemeClr val="tx1"/>
-          </a:fontRef>
-        </p:style>
-      </p:cxnSp>
-      <p:sp>
-        <p:nvSpPr>
-          <p:cNvPr id="31" name="Rectangle 30"/>
-          <p:cNvSpPr/>
-          <p:nvPr/>
-        </p:nvSpPr>
-        <p:spPr>
-          <a:xfrm>
-            <a:off x="3349106" y="6832936"/>
-            <a:ext cx="2104570" cy="544076"/>
-          </a:xfrm>
-          <a:prstGeom prst="rect">
-            <a:avLst/>
-          </a:prstGeom>
-          <a:noFill/>
-          <a:ln>
-            <a:solidFill>
-              <a:schemeClr val="tx1"/>
-            </a:solidFill>
-          </a:ln>
-        </p:spPr>
-        <p:style>
-          <a:lnRef idx="2">
-            <a:schemeClr val="accent1">
-              <a:shade val="50000"/>
-            </a:schemeClr>
-          </a:lnRef>
-          <a:fillRef idx="1">
-            <a:schemeClr val="accent1"/>
-          </a:fillRef>
-          <a:effectRef idx="0">
-            <a:schemeClr val="accent1"/>
-          </a:effectRef>
-          <a:fontRef idx="minor">
-            <a:schemeClr val="lt1"/>
-          </a:fontRef>
-        </p:style>
-        <p:txBody>
-          <a:bodyPr rtlCol="0" anchor="ctr"/>
-          <a:lstStyle/>
-          <a:p>
-            <a:pPr algn="ctr"/>
-            <a:endParaRPr lang="id-ID" sz="1200">
-              <a:latin typeface="Times New Roman" panose="02020603050405020304" pitchFamily="18" charset="0"/>
-              <a:cs typeface="Times New Roman" panose="02020603050405020304" pitchFamily="18" charset="0"/>
-            </a:endParaRPr>
-          </a:p>
-        </p:txBody>
-      </p:sp>
-      <p:sp>
-        <p:nvSpPr>
-          <p:cNvPr id="32" name="TextBox 31"/>
-          <p:cNvSpPr txBox="1"/>
-          <p:nvPr/>
-        </p:nvSpPr>
-        <p:spPr>
-          <a:xfrm>
-            <a:off x="3349106" y="6979219"/>
-            <a:ext cx="2098304" cy="276999"/>
-          </a:xfrm>
-          <a:prstGeom prst="rect">
-            <a:avLst/>
-          </a:prstGeom>
-          <a:noFill/>
-        </p:spPr>
-        <p:txBody>
-          <a:bodyPr wrap="square" rtlCol="0">
-            <a:spAutoFit/>
-          </a:bodyPr>
-          <a:lstStyle/>
-          <a:p>
-            <a:pPr algn="ctr"/>
-            <a:r>
-              <a:rPr lang="id-ID" sz="1200" dirty="0" smtClean="0">
-                <a:latin typeface="Times New Roman" panose="02020603050405020304" pitchFamily="18" charset="0"/>
-                <a:cs typeface="Times New Roman" panose="02020603050405020304" pitchFamily="18" charset="0"/>
-              </a:rPr>
-              <a:t>Microplanning &amp; Realisation</a:t>
-            </a:r>
-            <a:endParaRPr lang="id-ID" sz="1200" dirty="0">
-              <a:latin typeface="Times New Roman" panose="02020603050405020304" pitchFamily="18" charset="0"/>
-              <a:cs typeface="Times New Roman" panose="02020603050405020304" pitchFamily="18" charset="0"/>
-            </a:endParaRPr>
-          </a:p>
-        </p:txBody>
-      </p:sp>
-      <p:cxnSp>
-        <p:nvCxnSpPr>
-          <p:cNvPr id="34" name="Straight Arrow Connector 33"/>
-          <p:cNvCxnSpPr/>
-          <p:nvPr/>
-        </p:nvCxnSpPr>
-        <p:spPr>
-          <a:xfrm>
-            <a:off x="4385883" y="4276689"/>
-            <a:ext cx="0" cy="223062"/>
-          </a:xfrm>
-          <a:prstGeom prst="straightConnector1">
-            <a:avLst/>
-          </a:prstGeom>
-          <a:ln>
-            <a:tailEnd type="triangle"/>
-          </a:ln>
-        </p:spPr>
-        <p:style>
-          <a:lnRef idx="1">
-            <a:schemeClr val="dk1"/>
-          </a:lnRef>
-          <a:fillRef idx="0">
-            <a:schemeClr val="dk1"/>
-          </a:fillRef>
-          <a:effectRef idx="0">
-            <a:schemeClr val="dk1"/>
-          </a:effectRef>
-          <a:fontRef idx="minor">
-            <a:schemeClr val="tx1"/>
-          </a:fontRef>
-        </p:style>
-      </p:cxnSp>
-      <p:cxnSp>
-        <p:nvCxnSpPr>
-          <p:cNvPr id="35" name="Straight Arrow Connector 34"/>
-          <p:cNvCxnSpPr/>
-          <p:nvPr/>
-        </p:nvCxnSpPr>
-        <p:spPr>
-          <a:xfrm>
-            <a:off x="8898739" y="1784210"/>
-            <a:ext cx="0" cy="223062"/>
-          </a:xfrm>
-          <a:prstGeom prst="straightConnector1">
-            <a:avLst/>
-          </a:prstGeom>
-          <a:ln>
-            <a:tailEnd type="triangle"/>
-          </a:ln>
-        </p:spPr>
-        <p:style>
-          <a:lnRef idx="1">
-            <a:schemeClr val="dk1"/>
-          </a:lnRef>
-          <a:fillRef idx="0">
-            <a:schemeClr val="dk1"/>
-          </a:fillRef>
-          <a:effectRef idx="0">
-            <a:schemeClr val="dk1"/>
-          </a:effectRef>
-          <a:fontRef idx="minor">
-            <a:schemeClr val="tx1"/>
-          </a:fontRef>
-        </p:style>
-      </p:cxnSp>
-      <p:cxnSp>
-        <p:nvCxnSpPr>
-          <p:cNvPr id="36" name="Straight Arrow Connector 35"/>
-          <p:cNvCxnSpPr/>
-          <p:nvPr/>
-        </p:nvCxnSpPr>
-        <p:spPr>
-          <a:xfrm>
-            <a:off x="8886405" y="2623136"/>
-            <a:ext cx="0" cy="223062"/>
-          </a:xfrm>
-          <a:prstGeom prst="straightConnector1">
-            <a:avLst/>
-          </a:prstGeom>
-          <a:ln>
-            <a:tailEnd type="triangle"/>
-          </a:ln>
-        </p:spPr>
-        <p:style>
-          <a:lnRef idx="1">
-            <a:schemeClr val="dk1"/>
-          </a:lnRef>
-          <a:fillRef idx="0">
-            <a:schemeClr val="dk1"/>
-          </a:fillRef>
-          <a:effectRef idx="0">
-            <a:schemeClr val="dk1"/>
-          </a:effectRef>
-          <a:fontRef idx="minor">
-            <a:schemeClr val="tx1"/>
-          </a:fontRef>
-        </p:style>
-      </p:cxnSp>
-      <p:cxnSp>
-        <p:nvCxnSpPr>
-          <p:cNvPr id="37" name="Straight Arrow Connector 36"/>
-          <p:cNvCxnSpPr/>
-          <p:nvPr/>
-        </p:nvCxnSpPr>
-        <p:spPr>
-          <a:xfrm>
-            <a:off x="4258286" y="2677991"/>
-            <a:ext cx="0" cy="223062"/>
-          </a:xfrm>
-          <a:prstGeom prst="straightConnector1">
-            <a:avLst/>
-          </a:prstGeom>
-          <a:ln>
-            <a:tailEnd type="triangle"/>
-          </a:ln>
-        </p:spPr>
-        <p:style>
-          <a:lnRef idx="1">
-            <a:schemeClr val="dk1"/>
-          </a:lnRef>
-          <a:fillRef idx="0">
-            <a:schemeClr val="dk1"/>
-          </a:fillRef>
-          <a:effectRef idx="0">
-            <a:schemeClr val="dk1"/>
-          </a:effectRef>
-          <a:fontRef idx="minor">
-            <a:schemeClr val="tx1"/>
-          </a:fontRef>
-        </p:style>
-      </p:cxnSp>
+        </p:txBody>
+      </p:sp>
     </p:spTree>
     <p:extLst>
       <p:ext uri="{BB962C8B-B14F-4D97-AF65-F5344CB8AC3E}">
@@ -7061,7 +7663,27 @@
       </a:bgFillStyleLst>
     </a:fmtScheme>
   </a:themeElements>
-  <a:objectDefaults/>
+  <a:objectDefaults>
+    <a:lnDef>
+      <a:spPr/>
+      <a:bodyPr/>
+      <a:lstStyle/>
+      <a:style>
+        <a:lnRef idx="1">
+          <a:schemeClr val="dk1"/>
+        </a:lnRef>
+        <a:fillRef idx="0">
+          <a:schemeClr val="dk1"/>
+        </a:fillRef>
+        <a:effectRef idx="0">
+          <a:schemeClr val="dk1"/>
+        </a:effectRef>
+        <a:fontRef idx="minor">
+          <a:schemeClr val="tx1"/>
+        </a:fontRef>
+      </a:style>
+    </a:lnDef>
+  </a:objectDefaults>
   <a:extraClrSchemeLst/>
   <a:extLst>
     <a:ext uri="{05A4C25C-085E-4340-85A3-A5531E510DB2}">

</xml_diff>

<commit_message>
Experiment 1, and removing png
</commit_message>
<xml_diff>
--- a/Resource/Skripsi/Desain Penelitian.pptx
+++ b/Resource/Skripsi/Desain Penelitian.pptx
@@ -245,7 +245,7 @@
           <a:p>
             <a:fld id="{C6FC749A-EAD3-4020-A427-C54C9831C0FF}" type="datetimeFigureOut">
               <a:rPr lang="id-ID" smtClean="0"/>
-              <a:t>24/08/2018</a:t>
+              <a:t>27/08/2018</a:t>
             </a:fld>
             <a:endParaRPr lang="id-ID"/>
           </a:p>
@@ -415,7 +415,7 @@
           <a:p>
             <a:fld id="{C6FC749A-EAD3-4020-A427-C54C9831C0FF}" type="datetimeFigureOut">
               <a:rPr lang="id-ID" smtClean="0"/>
-              <a:t>24/08/2018</a:t>
+              <a:t>27/08/2018</a:t>
             </a:fld>
             <a:endParaRPr lang="id-ID"/>
           </a:p>
@@ -595,7 +595,7 @@
           <a:p>
             <a:fld id="{C6FC749A-EAD3-4020-A427-C54C9831C0FF}" type="datetimeFigureOut">
               <a:rPr lang="id-ID" smtClean="0"/>
-              <a:t>24/08/2018</a:t>
+              <a:t>27/08/2018</a:t>
             </a:fld>
             <a:endParaRPr lang="id-ID"/>
           </a:p>
@@ -765,7 +765,7 @@
           <a:p>
             <a:fld id="{C6FC749A-EAD3-4020-A427-C54C9831C0FF}" type="datetimeFigureOut">
               <a:rPr lang="id-ID" smtClean="0"/>
-              <a:t>24/08/2018</a:t>
+              <a:t>27/08/2018</a:t>
             </a:fld>
             <a:endParaRPr lang="id-ID"/>
           </a:p>
@@ -1011,7 +1011,7 @@
           <a:p>
             <a:fld id="{C6FC749A-EAD3-4020-A427-C54C9831C0FF}" type="datetimeFigureOut">
               <a:rPr lang="id-ID" smtClean="0"/>
-              <a:t>24/08/2018</a:t>
+              <a:t>27/08/2018</a:t>
             </a:fld>
             <a:endParaRPr lang="id-ID"/>
           </a:p>
@@ -1243,7 +1243,7 @@
           <a:p>
             <a:fld id="{C6FC749A-EAD3-4020-A427-C54C9831C0FF}" type="datetimeFigureOut">
               <a:rPr lang="id-ID" smtClean="0"/>
-              <a:t>24/08/2018</a:t>
+              <a:t>27/08/2018</a:t>
             </a:fld>
             <a:endParaRPr lang="id-ID"/>
           </a:p>
@@ -1610,7 +1610,7 @@
           <a:p>
             <a:fld id="{C6FC749A-EAD3-4020-A427-C54C9831C0FF}" type="datetimeFigureOut">
               <a:rPr lang="id-ID" smtClean="0"/>
-              <a:t>24/08/2018</a:t>
+              <a:t>27/08/2018</a:t>
             </a:fld>
             <a:endParaRPr lang="id-ID"/>
           </a:p>
@@ -1728,7 +1728,7 @@
           <a:p>
             <a:fld id="{C6FC749A-EAD3-4020-A427-C54C9831C0FF}" type="datetimeFigureOut">
               <a:rPr lang="id-ID" smtClean="0"/>
-              <a:t>24/08/2018</a:t>
+              <a:t>27/08/2018</a:t>
             </a:fld>
             <a:endParaRPr lang="id-ID"/>
           </a:p>
@@ -1823,7 +1823,7 @@
           <a:p>
             <a:fld id="{C6FC749A-EAD3-4020-A427-C54C9831C0FF}" type="datetimeFigureOut">
               <a:rPr lang="id-ID" smtClean="0"/>
-              <a:t>24/08/2018</a:t>
+              <a:t>27/08/2018</a:t>
             </a:fld>
             <a:endParaRPr lang="id-ID"/>
           </a:p>
@@ -2100,7 +2100,7 @@
           <a:p>
             <a:fld id="{C6FC749A-EAD3-4020-A427-C54C9831C0FF}" type="datetimeFigureOut">
               <a:rPr lang="id-ID" smtClean="0"/>
-              <a:t>24/08/2018</a:t>
+              <a:t>27/08/2018</a:t>
             </a:fld>
             <a:endParaRPr lang="id-ID"/>
           </a:p>
@@ -2353,7 +2353,7 @@
           <a:p>
             <a:fld id="{C6FC749A-EAD3-4020-A427-C54C9831C0FF}" type="datetimeFigureOut">
               <a:rPr lang="id-ID" smtClean="0"/>
-              <a:t>24/08/2018</a:t>
+              <a:t>27/08/2018</a:t>
             </a:fld>
             <a:endParaRPr lang="id-ID"/>
           </a:p>
@@ -2566,7 +2566,7 @@
           <a:p>
             <a:fld id="{C6FC749A-EAD3-4020-A427-C54C9831C0FF}" type="datetimeFigureOut">
               <a:rPr lang="id-ID" smtClean="0"/>
-              <a:t>24/08/2018</a:t>
+              <a:t>27/08/2018</a:t>
             </a:fld>
             <a:endParaRPr lang="id-ID"/>
           </a:p>
@@ -11154,7 +11154,7 @@
           <p:spPr>
             <a:xfrm>
               <a:off x="4864634" y="2193857"/>
-              <a:ext cx="1461115" cy="400110"/>
+              <a:ext cx="1461115" cy="242759"/>
             </a:xfrm>
             <a:prstGeom prst="rect">
               <a:avLst/>
@@ -11169,16 +11169,16 @@
             <a:p>
               <a:pPr algn="ctr"/>
               <a:r>
-                <a:rPr lang="en-ID" sz="1000" dirty="0" err="1" smtClean="0">
+                <a:rPr lang="en-ID" sz="1000" dirty="0" smtClean="0">
                   <a:cs typeface="Times New Roman" panose="02020603050405020304" pitchFamily="18" charset="0"/>
                 </a:rPr>
-                <a:t>Macroplaning</a:t>
+                <a:t>Macroplanning </a:t>
               </a:r>
               <a:r>
                 <a:rPr lang="en-ID" sz="1000" dirty="0" smtClean="0">
                   <a:cs typeface="Times New Roman" panose="02020603050405020304" pitchFamily="18" charset="0"/>
                 </a:rPr>
-                <a:t> &amp;</a:t>
+                <a:t>&amp;</a:t>
               </a:r>
             </a:p>
             <a:p>

</xml_diff>

<commit_message>
Minor Changes ( 4.2 model proses SA)
</commit_message>
<xml_diff>
--- a/Resource/Skripsi/Desain Penelitian.pptx
+++ b/Resource/Skripsi/Desain Penelitian.pptx
@@ -247,7 +247,7 @@
           <a:p>
             <a:fld id="{C6FC749A-EAD3-4020-A427-C54C9831C0FF}" type="datetimeFigureOut">
               <a:rPr lang="id-ID" smtClean="0"/>
-              <a:t>08/09/2018</a:t>
+              <a:t>09/11/2018</a:t>
             </a:fld>
             <a:endParaRPr lang="id-ID"/>
           </a:p>
@@ -417,7 +417,7 @@
           <a:p>
             <a:fld id="{C6FC749A-EAD3-4020-A427-C54C9831C0FF}" type="datetimeFigureOut">
               <a:rPr lang="id-ID" smtClean="0"/>
-              <a:t>08/09/2018</a:t>
+              <a:t>09/11/2018</a:t>
             </a:fld>
             <a:endParaRPr lang="id-ID"/>
           </a:p>
@@ -597,7 +597,7 @@
           <a:p>
             <a:fld id="{C6FC749A-EAD3-4020-A427-C54C9831C0FF}" type="datetimeFigureOut">
               <a:rPr lang="id-ID" smtClean="0"/>
-              <a:t>08/09/2018</a:t>
+              <a:t>09/11/2018</a:t>
             </a:fld>
             <a:endParaRPr lang="id-ID"/>
           </a:p>
@@ -767,7 +767,7 @@
           <a:p>
             <a:fld id="{C6FC749A-EAD3-4020-A427-C54C9831C0FF}" type="datetimeFigureOut">
               <a:rPr lang="id-ID" smtClean="0"/>
-              <a:t>08/09/2018</a:t>
+              <a:t>09/11/2018</a:t>
             </a:fld>
             <a:endParaRPr lang="id-ID"/>
           </a:p>
@@ -1013,7 +1013,7 @@
           <a:p>
             <a:fld id="{C6FC749A-EAD3-4020-A427-C54C9831C0FF}" type="datetimeFigureOut">
               <a:rPr lang="id-ID" smtClean="0"/>
-              <a:t>08/09/2018</a:t>
+              <a:t>09/11/2018</a:t>
             </a:fld>
             <a:endParaRPr lang="id-ID"/>
           </a:p>
@@ -1245,7 +1245,7 @@
           <a:p>
             <a:fld id="{C6FC749A-EAD3-4020-A427-C54C9831C0FF}" type="datetimeFigureOut">
               <a:rPr lang="id-ID" smtClean="0"/>
-              <a:t>08/09/2018</a:t>
+              <a:t>09/11/2018</a:t>
             </a:fld>
             <a:endParaRPr lang="id-ID"/>
           </a:p>
@@ -1612,7 +1612,7 @@
           <a:p>
             <a:fld id="{C6FC749A-EAD3-4020-A427-C54C9831C0FF}" type="datetimeFigureOut">
               <a:rPr lang="id-ID" smtClean="0"/>
-              <a:t>08/09/2018</a:t>
+              <a:t>09/11/2018</a:t>
             </a:fld>
             <a:endParaRPr lang="id-ID"/>
           </a:p>
@@ -1730,7 +1730,7 @@
           <a:p>
             <a:fld id="{C6FC749A-EAD3-4020-A427-C54C9831C0FF}" type="datetimeFigureOut">
               <a:rPr lang="id-ID" smtClean="0"/>
-              <a:t>08/09/2018</a:t>
+              <a:t>09/11/2018</a:t>
             </a:fld>
             <a:endParaRPr lang="id-ID"/>
           </a:p>
@@ -1825,7 +1825,7 @@
           <a:p>
             <a:fld id="{C6FC749A-EAD3-4020-A427-C54C9831C0FF}" type="datetimeFigureOut">
               <a:rPr lang="id-ID" smtClean="0"/>
-              <a:t>08/09/2018</a:t>
+              <a:t>09/11/2018</a:t>
             </a:fld>
             <a:endParaRPr lang="id-ID"/>
           </a:p>
@@ -2102,7 +2102,7 @@
           <a:p>
             <a:fld id="{C6FC749A-EAD3-4020-A427-C54C9831C0FF}" type="datetimeFigureOut">
               <a:rPr lang="id-ID" smtClean="0"/>
-              <a:t>08/09/2018</a:t>
+              <a:t>09/11/2018</a:t>
             </a:fld>
             <a:endParaRPr lang="id-ID"/>
           </a:p>
@@ -2355,7 +2355,7 @@
           <a:p>
             <a:fld id="{C6FC749A-EAD3-4020-A427-C54C9831C0FF}" type="datetimeFigureOut">
               <a:rPr lang="id-ID" smtClean="0"/>
-              <a:t>08/09/2018</a:t>
+              <a:t>09/11/2018</a:t>
             </a:fld>
             <a:endParaRPr lang="id-ID"/>
           </a:p>
@@ -2568,7 +2568,7 @@
           <a:p>
             <a:fld id="{C6FC749A-EAD3-4020-A427-C54C9831C0FF}" type="datetimeFigureOut">
               <a:rPr lang="id-ID" smtClean="0"/>
-              <a:t>08/09/2018</a:t>
+              <a:t>09/11/2018</a:t>
             </a:fld>
             <a:endParaRPr lang="id-ID"/>
           </a:p>
@@ -6957,34 +6957,6 @@
                 <a:latin typeface="Times New Roman" panose="02020603050405020304" pitchFamily="18" charset="0"/>
                 <a:cs typeface="Times New Roman" panose="02020603050405020304" pitchFamily="18" charset="0"/>
               </a:rPr>
-              <a:t>Analisis</a:t>
-            </a:r>
-            <a:r>
-              <a:rPr lang="en-ID" sz="1200" dirty="0" smtClean="0">
-                <a:latin typeface="Times New Roman" panose="02020603050405020304" pitchFamily="18" charset="0"/>
-                <a:cs typeface="Times New Roman" panose="02020603050405020304" pitchFamily="18" charset="0"/>
-              </a:rPr>
-              <a:t> </a:t>
-            </a:r>
-            <a:r>
-              <a:rPr lang="en-ID" sz="1200" dirty="0" err="1" smtClean="0">
-                <a:latin typeface="Times New Roman" panose="02020603050405020304" pitchFamily="18" charset="0"/>
-                <a:cs typeface="Times New Roman" panose="02020603050405020304" pitchFamily="18" charset="0"/>
-              </a:rPr>
-              <a:t>Hasil</a:t>
-            </a:r>
-            <a:r>
-              <a:rPr lang="en-ID" sz="1200" dirty="0" smtClean="0">
-                <a:latin typeface="Times New Roman" panose="02020603050405020304" pitchFamily="18" charset="0"/>
-                <a:cs typeface="Times New Roman" panose="02020603050405020304" pitchFamily="18" charset="0"/>
-              </a:rPr>
-              <a:t> </a:t>
-            </a:r>
-            <a:r>
-              <a:rPr lang="en-ID" sz="1200" dirty="0" err="1" smtClean="0">
-                <a:latin typeface="Times New Roman" panose="02020603050405020304" pitchFamily="18" charset="0"/>
-                <a:cs typeface="Times New Roman" panose="02020603050405020304" pitchFamily="18" charset="0"/>
-              </a:rPr>
               <a:t>Eksperimen</a:t>
             </a:r>
             <a:endParaRPr lang="id-ID" sz="1200" dirty="0">
@@ -7067,21 +7039,35 @@
           <a:p>
             <a:pPr algn="ctr"/>
             <a:r>
-              <a:rPr lang="en-ID" sz="1200" dirty="0" err="1" smtClean="0">
+              <a:rPr lang="en-ID" sz="1200" dirty="0" err="1">
                 <a:latin typeface="Times New Roman" panose="02020603050405020304" pitchFamily="18" charset="0"/>
                 <a:cs typeface="Times New Roman" panose="02020603050405020304" pitchFamily="18" charset="0"/>
               </a:rPr>
-              <a:t>Desain</a:t>
-            </a:r>
-            <a:r>
-              <a:rPr lang="en-ID" sz="1200" dirty="0" smtClean="0">
+              <a:t>Analisis</a:t>
+            </a:r>
+            <a:r>
+              <a:rPr lang="en-ID" sz="1200" dirty="0">
                 <a:latin typeface="Times New Roman" panose="02020603050405020304" pitchFamily="18" charset="0"/>
                 <a:cs typeface="Times New Roman" panose="02020603050405020304" pitchFamily="18" charset="0"/>
               </a:rPr>
               <a:t> </a:t>
             </a:r>
             <a:r>
-              <a:rPr lang="en-ID" sz="1200" dirty="0" err="1" smtClean="0">
+              <a:rPr lang="en-ID" sz="1200" dirty="0" err="1">
+                <a:latin typeface="Times New Roman" panose="02020603050405020304" pitchFamily="18" charset="0"/>
+                <a:cs typeface="Times New Roman" panose="02020603050405020304" pitchFamily="18" charset="0"/>
+              </a:rPr>
+              <a:t>Hasil</a:t>
+            </a:r>
+            <a:r>
+              <a:rPr lang="en-ID" sz="1200" dirty="0">
+                <a:latin typeface="Times New Roman" panose="02020603050405020304" pitchFamily="18" charset="0"/>
+                <a:cs typeface="Times New Roman" panose="02020603050405020304" pitchFamily="18" charset="0"/>
+              </a:rPr>
+              <a:t> </a:t>
+            </a:r>
+            <a:r>
+              <a:rPr lang="en-ID" sz="1200" dirty="0" err="1">
                 <a:latin typeface="Times New Roman" panose="02020603050405020304" pitchFamily="18" charset="0"/>
                 <a:cs typeface="Times New Roman" panose="02020603050405020304" pitchFamily="18" charset="0"/>
               </a:rPr>
@@ -7167,25 +7153,25 @@
           <a:p>
             <a:pPr algn="ctr"/>
             <a:r>
+              <a:rPr lang="en-ID" sz="1200" dirty="0" err="1">
+                <a:latin typeface="Times New Roman" panose="02020603050405020304" pitchFamily="18" charset="0"/>
+                <a:cs typeface="Times New Roman" panose="02020603050405020304" pitchFamily="18" charset="0"/>
+              </a:rPr>
+              <a:t>Desain</a:t>
+            </a:r>
+            <a:r>
+              <a:rPr lang="en-ID" sz="1200" dirty="0">
+                <a:latin typeface="Times New Roman" panose="02020603050405020304" pitchFamily="18" charset="0"/>
+                <a:cs typeface="Times New Roman" panose="02020603050405020304" pitchFamily="18" charset="0"/>
+              </a:rPr>
+              <a:t> </a:t>
+            </a:r>
+            <a:r>
               <a:rPr lang="en-ID" sz="1200" dirty="0" err="1" smtClean="0">
                 <a:latin typeface="Times New Roman" panose="02020603050405020304" pitchFamily="18" charset="0"/>
                 <a:cs typeface="Times New Roman" panose="02020603050405020304" pitchFamily="18" charset="0"/>
               </a:rPr>
-              <a:t>Penarikan</a:t>
-            </a:r>
-            <a:r>
-              <a:rPr lang="en-ID" sz="1200" dirty="0" smtClean="0">
-                <a:latin typeface="Times New Roman" panose="02020603050405020304" pitchFamily="18" charset="0"/>
-                <a:cs typeface="Times New Roman" panose="02020603050405020304" pitchFamily="18" charset="0"/>
-              </a:rPr>
-              <a:t> </a:t>
-            </a:r>
-            <a:r>
-              <a:rPr lang="en-ID" sz="1200" dirty="0" err="1" smtClean="0">
-                <a:latin typeface="Times New Roman" panose="02020603050405020304" pitchFamily="18" charset="0"/>
-                <a:cs typeface="Times New Roman" panose="02020603050405020304" pitchFamily="18" charset="0"/>
-              </a:rPr>
-              <a:t>Kesimpulan</a:t>
+              <a:t>Eksperimen</a:t>
             </a:r>
             <a:endParaRPr lang="id-ID" sz="1200" dirty="0">
               <a:latin typeface="Times New Roman" panose="02020603050405020304" pitchFamily="18" charset="0"/>
@@ -7352,7 +7338,7 @@
         <p:spPr>
           <a:xfrm>
             <a:off x="2511377" y="9466303"/>
-            <a:ext cx="2542684" cy="276999"/>
+            <a:ext cx="2542684" cy="461665"/>
           </a:xfrm>
           <a:prstGeom prst="rect">
             <a:avLst/>
@@ -7367,33 +7353,345 @@
           <a:p>
             <a:pPr algn="ctr"/>
             <a:r>
-              <a:rPr lang="en-ID" sz="1200" dirty="0" err="1" smtClean="0">
+              <a:rPr lang="en-ID" sz="1200" dirty="0" err="1">
                 <a:latin typeface="Times New Roman" panose="02020603050405020304" pitchFamily="18" charset="0"/>
                 <a:cs typeface="Times New Roman" panose="02020603050405020304" pitchFamily="18" charset="0"/>
               </a:rPr>
-              <a:t>Desain</a:t>
-            </a:r>
-            <a:r>
-              <a:rPr lang="en-ID" sz="1200" dirty="0" smtClean="0">
+              <a:t>Penarikan</a:t>
+            </a:r>
+            <a:r>
+              <a:rPr lang="en-ID" sz="1200" dirty="0">
                 <a:latin typeface="Times New Roman" panose="02020603050405020304" pitchFamily="18" charset="0"/>
                 <a:cs typeface="Times New Roman" panose="02020603050405020304" pitchFamily="18" charset="0"/>
               </a:rPr>
               <a:t> </a:t>
             </a:r>
             <a:r>
-              <a:rPr lang="en-ID" sz="1200" dirty="0" err="1" smtClean="0">
+              <a:rPr lang="en-ID" sz="1200" dirty="0" err="1">
                 <a:latin typeface="Times New Roman" panose="02020603050405020304" pitchFamily="18" charset="0"/>
                 <a:cs typeface="Times New Roman" panose="02020603050405020304" pitchFamily="18" charset="0"/>
               </a:rPr>
-              <a:t>Eksperimen</a:t>
+              <a:t>Kesimpulan</a:t>
             </a:r>
             <a:endParaRPr lang="id-ID" sz="1200" dirty="0">
               <a:latin typeface="Times New Roman" panose="02020603050405020304" pitchFamily="18" charset="0"/>
               <a:cs typeface="Times New Roman" panose="02020603050405020304" pitchFamily="18" charset="0"/>
             </a:endParaRPr>
           </a:p>
-        </p:txBody>
-      </p:sp>
+          <a:p>
+            <a:pPr algn="ctr"/>
+            <a:endParaRPr lang="id-ID" sz="1200" dirty="0">
+              <a:latin typeface="Times New Roman" panose="02020603050405020304" pitchFamily="18" charset="0"/>
+              <a:cs typeface="Times New Roman" panose="02020603050405020304" pitchFamily="18" charset="0"/>
+            </a:endParaRPr>
+          </a:p>
+        </p:txBody>
+      </p:sp>
+      <p:cxnSp>
+        <p:nvCxnSpPr>
+          <p:cNvPr id="3" name="Straight Arrow Connector 2"/>
+          <p:cNvCxnSpPr>
+            <a:stCxn id="4" idx="3"/>
+          </p:cNvCxnSpPr>
+          <p:nvPr/>
+        </p:nvCxnSpPr>
+        <p:spPr>
+          <a:xfrm flipV="1">
+            <a:off x="5140310" y="86497"/>
+            <a:ext cx="258434" cy="49"/>
+          </a:xfrm>
+          <a:prstGeom prst="straightConnector1">
+            <a:avLst/>
+          </a:prstGeom>
+          <a:ln>
+            <a:tailEnd type="triangle"/>
+          </a:ln>
+        </p:spPr>
+        <p:style>
+          <a:lnRef idx="1">
+            <a:schemeClr val="dk1"/>
+          </a:lnRef>
+          <a:fillRef idx="0">
+            <a:schemeClr val="dk1"/>
+          </a:fillRef>
+          <a:effectRef idx="0">
+            <a:schemeClr val="dk1"/>
+          </a:effectRef>
+          <a:fontRef idx="minor">
+            <a:schemeClr val="tx1"/>
+          </a:fontRef>
+        </p:style>
+      </p:cxnSp>
+      <p:cxnSp>
+        <p:nvCxnSpPr>
+          <p:cNvPr id="13" name="Straight Arrow Connector 12"/>
+          <p:cNvCxnSpPr>
+            <a:endCxn id="9" idx="3"/>
+          </p:cNvCxnSpPr>
+          <p:nvPr/>
+        </p:nvCxnSpPr>
+        <p:spPr>
+          <a:xfrm flipH="1">
+            <a:off x="5121450" y="1485900"/>
+            <a:ext cx="254838" cy="2330"/>
+          </a:xfrm>
+          <a:prstGeom prst="straightConnector1">
+            <a:avLst/>
+          </a:prstGeom>
+          <a:ln>
+            <a:tailEnd type="triangle"/>
+          </a:ln>
+        </p:spPr>
+        <p:style>
+          <a:lnRef idx="1">
+            <a:schemeClr val="dk1"/>
+          </a:lnRef>
+          <a:fillRef idx="0">
+            <a:schemeClr val="dk1"/>
+          </a:fillRef>
+          <a:effectRef idx="0">
+            <a:schemeClr val="dk1"/>
+          </a:effectRef>
+          <a:fontRef idx="minor">
+            <a:schemeClr val="tx1"/>
+          </a:fontRef>
+        </p:style>
+      </p:cxnSp>
+      <p:cxnSp>
+        <p:nvCxnSpPr>
+          <p:cNvPr id="16" name="Straight Arrow Connector 15"/>
+          <p:cNvCxnSpPr>
+            <a:stCxn id="8" idx="2"/>
+          </p:cNvCxnSpPr>
+          <p:nvPr/>
+        </p:nvCxnSpPr>
+        <p:spPr>
+          <a:xfrm>
+            <a:off x="3807601" y="2118740"/>
+            <a:ext cx="5574" cy="347787"/>
+          </a:xfrm>
+          <a:prstGeom prst="straightConnector1">
+            <a:avLst/>
+          </a:prstGeom>
+          <a:ln>
+            <a:tailEnd type="triangle"/>
+          </a:ln>
+        </p:spPr>
+        <p:style>
+          <a:lnRef idx="1">
+            <a:schemeClr val="dk1"/>
+          </a:lnRef>
+          <a:fillRef idx="0">
+            <a:schemeClr val="dk1"/>
+          </a:fillRef>
+          <a:effectRef idx="0">
+            <a:schemeClr val="dk1"/>
+          </a:effectRef>
+          <a:fontRef idx="minor">
+            <a:schemeClr val="tx1"/>
+          </a:fontRef>
+        </p:style>
+      </p:cxnSp>
+      <p:cxnSp>
+        <p:nvCxnSpPr>
+          <p:cNvPr id="25" name="Straight Arrow Connector 24"/>
+          <p:cNvCxnSpPr/>
+          <p:nvPr/>
+        </p:nvCxnSpPr>
+        <p:spPr>
+          <a:xfrm>
+            <a:off x="3933825" y="6804993"/>
+            <a:ext cx="0" cy="202803"/>
+          </a:xfrm>
+          <a:prstGeom prst="straightConnector1">
+            <a:avLst/>
+          </a:prstGeom>
+          <a:ln>
+            <a:tailEnd type="triangle"/>
+          </a:ln>
+        </p:spPr>
+        <p:style>
+          <a:lnRef idx="1">
+            <a:schemeClr val="dk1"/>
+          </a:lnRef>
+          <a:fillRef idx="0">
+            <a:schemeClr val="dk1"/>
+          </a:fillRef>
+          <a:effectRef idx="0">
+            <a:schemeClr val="dk1"/>
+          </a:effectRef>
+          <a:fontRef idx="minor">
+            <a:schemeClr val="tx1"/>
+          </a:fontRef>
+        </p:style>
+      </p:cxnSp>
+      <p:cxnSp>
+        <p:nvCxnSpPr>
+          <p:cNvPr id="28" name="Straight Arrow Connector 27"/>
+          <p:cNvCxnSpPr>
+            <a:endCxn id="77" idx="1"/>
+          </p:cNvCxnSpPr>
+          <p:nvPr/>
+        </p:nvCxnSpPr>
+        <p:spPr>
+          <a:xfrm flipV="1">
+            <a:off x="5072669" y="7315910"/>
+            <a:ext cx="262868" cy="4053"/>
+          </a:xfrm>
+          <a:prstGeom prst="straightConnector1">
+            <a:avLst/>
+          </a:prstGeom>
+          <a:ln>
+            <a:tailEnd type="triangle"/>
+          </a:ln>
+        </p:spPr>
+        <p:style>
+          <a:lnRef idx="1">
+            <a:schemeClr val="dk1"/>
+          </a:lnRef>
+          <a:fillRef idx="0">
+            <a:schemeClr val="dk1"/>
+          </a:fillRef>
+          <a:effectRef idx="0">
+            <a:schemeClr val="dk1"/>
+          </a:effectRef>
+          <a:fontRef idx="minor">
+            <a:schemeClr val="tx1"/>
+          </a:fontRef>
+        </p:style>
+      </p:cxnSp>
+      <p:cxnSp>
+        <p:nvCxnSpPr>
+          <p:cNvPr id="67" name="Straight Arrow Connector 66"/>
+          <p:cNvCxnSpPr/>
+          <p:nvPr/>
+        </p:nvCxnSpPr>
+        <p:spPr>
+          <a:xfrm>
+            <a:off x="6681788" y="7600356"/>
+            <a:ext cx="0" cy="202803"/>
+          </a:xfrm>
+          <a:prstGeom prst="straightConnector1">
+            <a:avLst/>
+          </a:prstGeom>
+          <a:ln>
+            <a:tailEnd type="triangle"/>
+          </a:ln>
+        </p:spPr>
+        <p:style>
+          <a:lnRef idx="1">
+            <a:schemeClr val="dk1"/>
+          </a:lnRef>
+          <a:fillRef idx="0">
+            <a:schemeClr val="dk1"/>
+          </a:fillRef>
+          <a:effectRef idx="0">
+            <a:schemeClr val="dk1"/>
+          </a:effectRef>
+          <a:fontRef idx="minor">
+            <a:schemeClr val="tx1"/>
+          </a:fontRef>
+        </p:style>
+      </p:cxnSp>
+      <p:cxnSp>
+        <p:nvCxnSpPr>
+          <p:cNvPr id="68" name="Straight Arrow Connector 67"/>
+          <p:cNvCxnSpPr/>
+          <p:nvPr/>
+        </p:nvCxnSpPr>
+        <p:spPr>
+          <a:xfrm>
+            <a:off x="6691313" y="8352183"/>
+            <a:ext cx="0" cy="202803"/>
+          </a:xfrm>
+          <a:prstGeom prst="straightConnector1">
+            <a:avLst/>
+          </a:prstGeom>
+          <a:ln>
+            <a:tailEnd type="triangle"/>
+          </a:ln>
+        </p:spPr>
+        <p:style>
+          <a:lnRef idx="1">
+            <a:schemeClr val="dk1"/>
+          </a:lnRef>
+          <a:fillRef idx="0">
+            <a:schemeClr val="dk1"/>
+          </a:fillRef>
+          <a:effectRef idx="0">
+            <a:schemeClr val="dk1"/>
+          </a:effectRef>
+          <a:fontRef idx="minor">
+            <a:schemeClr val="tx1"/>
+          </a:fontRef>
+        </p:style>
+      </p:cxnSp>
+      <p:cxnSp>
+        <p:nvCxnSpPr>
+          <p:cNvPr id="69" name="Straight Arrow Connector 68"/>
+          <p:cNvCxnSpPr/>
+          <p:nvPr/>
+        </p:nvCxnSpPr>
+        <p:spPr>
+          <a:xfrm>
+            <a:off x="6700838" y="9104010"/>
+            <a:ext cx="0" cy="202803"/>
+          </a:xfrm>
+          <a:prstGeom prst="straightConnector1">
+            <a:avLst/>
+          </a:prstGeom>
+          <a:ln>
+            <a:tailEnd type="triangle"/>
+          </a:ln>
+        </p:spPr>
+        <p:style>
+          <a:lnRef idx="1">
+            <a:schemeClr val="dk1"/>
+          </a:lnRef>
+          <a:fillRef idx="0">
+            <a:schemeClr val="dk1"/>
+          </a:fillRef>
+          <a:effectRef idx="0">
+            <a:schemeClr val="dk1"/>
+          </a:effectRef>
+          <a:fontRef idx="minor">
+            <a:schemeClr val="tx1"/>
+          </a:fontRef>
+        </p:style>
+      </p:cxnSp>
+      <p:cxnSp>
+        <p:nvCxnSpPr>
+          <p:cNvPr id="70" name="Straight Arrow Connector 69"/>
+          <p:cNvCxnSpPr/>
+          <p:nvPr/>
+        </p:nvCxnSpPr>
+        <p:spPr>
+          <a:xfrm flipH="1">
+            <a:off x="5078138" y="9620188"/>
+            <a:ext cx="254838" cy="2330"/>
+          </a:xfrm>
+          <a:prstGeom prst="straightConnector1">
+            <a:avLst/>
+          </a:prstGeom>
+          <a:ln>
+            <a:tailEnd type="triangle"/>
+          </a:ln>
+        </p:spPr>
+        <p:style>
+          <a:lnRef idx="1">
+            <a:schemeClr val="dk1"/>
+          </a:lnRef>
+          <a:fillRef idx="0">
+            <a:schemeClr val="dk1"/>
+          </a:fillRef>
+          <a:effectRef idx="0">
+            <a:schemeClr val="dk1"/>
+          </a:effectRef>
+          <a:fontRef idx="minor">
+            <a:schemeClr val="tx1"/>
+          </a:fontRef>
+        </p:style>
+      </p:cxnSp>
     </p:spTree>
     <p:extLst>
       <p:ext uri="{BB962C8B-B14F-4D97-AF65-F5344CB8AC3E}">
@@ -8320,12 +8618,6 @@
           <a:p>
             <a:pPr algn="ctr"/>
             <a:r>
-              <a:rPr lang="en-ID" sz="1000" dirty="0" smtClean="0">
-                <a:cs typeface="Times New Roman" panose="02020603050405020304" pitchFamily="18" charset="0"/>
-              </a:rPr>
-              <a:t>Parameter </a:t>
-            </a:r>
-            <a:r>
               <a:rPr lang="en-ID" sz="1000" dirty="0" err="1" smtClean="0">
                 <a:cs typeface="Times New Roman" panose="02020603050405020304" pitchFamily="18" charset="0"/>
               </a:rPr>
@@ -8472,7 +8764,7 @@
         <p:spPr>
           <a:xfrm>
             <a:off x="1957092" y="3867308"/>
-            <a:ext cx="1397000" cy="1015663"/>
+            <a:ext cx="1397000" cy="861774"/>
           </a:xfrm>
           <a:prstGeom prst="rect">
             <a:avLst/>
@@ -8489,13 +8781,13 @@
               <a:rPr lang="en-ID" sz="1000" dirty="0" smtClean="0">
                 <a:cs typeface="Times New Roman" panose="02020603050405020304" pitchFamily="18" charset="0"/>
               </a:rPr>
-              <a:t>-User defined </a:t>
+              <a:t>-Default parameter </a:t>
             </a:r>
             <a:r>
               <a:rPr lang="en-ID" sz="1000" dirty="0" err="1" smtClean="0">
                 <a:cs typeface="Times New Roman" panose="02020603050405020304" pitchFamily="18" charset="0"/>
               </a:rPr>
-              <a:t>config</a:t>
+              <a:t>Config</a:t>
             </a:r>
             <a:endParaRPr lang="en-ID" sz="1000" dirty="0" smtClean="0">
               <a:cs typeface="Times New Roman" panose="02020603050405020304" pitchFamily="18" charset="0"/>
@@ -8506,31 +8798,42 @@
               <a:rPr lang="en-ID" sz="1000" dirty="0" smtClean="0">
                 <a:cs typeface="Times New Roman" panose="02020603050405020304" pitchFamily="18" charset="0"/>
               </a:rPr>
-              <a:t>-Data Interval</a:t>
-            </a:r>
-          </a:p>
-          <a:p>
+              <a:t>-</a:t>
+            </a:r>
             <a:r>
               <a:rPr lang="en-ID" sz="1000" dirty="0" smtClean="0">
                 <a:cs typeface="Times New Roman" panose="02020603050405020304" pitchFamily="18" charset="0"/>
               </a:rPr>
-              <a:t>-Type (numerical, categorical)</a:t>
-            </a:r>
-          </a:p>
-          <a:p>
+              <a:t>User defined </a:t>
+            </a:r>
             <a:r>
               <a:rPr lang="en-ID" sz="1000" dirty="0" smtClean="0">
                 <a:cs typeface="Times New Roman" panose="02020603050405020304" pitchFamily="18" charset="0"/>
               </a:rPr>
-              <a:t>-Rule(fuzzy, range)</a:t>
-            </a:r>
+              <a:t>parameter </a:t>
+            </a:r>
+            <a:r>
+              <a:rPr lang="en-ID" sz="1000" dirty="0" err="1" smtClean="0">
+                <a:cs typeface="Times New Roman" panose="02020603050405020304" pitchFamily="18" charset="0"/>
+              </a:rPr>
+              <a:t>config</a:t>
+            </a:r>
+            <a:endParaRPr lang="en-ID" sz="1000" dirty="0" smtClean="0">
+              <a:cs typeface="Times New Roman" panose="02020603050405020304" pitchFamily="18" charset="0"/>
+            </a:endParaRPr>
           </a:p>
           <a:p>
             <a:r>
               <a:rPr lang="en-ID" sz="1000" dirty="0" smtClean="0">
                 <a:cs typeface="Times New Roman" panose="02020603050405020304" pitchFamily="18" charset="0"/>
               </a:rPr>
-              <a:t>-Alternate (Replacer)</a:t>
+              <a:t>-Data </a:t>
+            </a:r>
+            <a:r>
+              <a:rPr lang="en-ID" sz="1000" dirty="0" smtClean="0">
+                <a:cs typeface="Times New Roman" panose="02020603050405020304" pitchFamily="18" charset="0"/>
+              </a:rPr>
+              <a:t>Interval</a:t>
             </a:r>
             <a:endParaRPr lang="id-ID" sz="1000" dirty="0">
               <a:cs typeface="Times New Roman" panose="02020603050405020304" pitchFamily="18" charset="0"/>
@@ -8900,7 +9203,13 @@
               <a:rPr lang="en-ID" sz="1000" dirty="0" smtClean="0">
                 <a:cs typeface="Times New Roman" panose="02020603050405020304" pitchFamily="18" charset="0"/>
               </a:rPr>
-              <a:t>Statistical Tools</a:t>
+              <a:t>Statistical </a:t>
+            </a:r>
+            <a:r>
+              <a:rPr lang="en-ID" sz="1000" dirty="0" smtClean="0">
+                <a:cs typeface="Times New Roman" panose="02020603050405020304" pitchFamily="18" charset="0"/>
+              </a:rPr>
+              <a:t>Analysis</a:t>
             </a:r>
             <a:endParaRPr lang="id-ID" sz="1000" dirty="0">
               <a:cs typeface="Times New Roman" panose="02020603050405020304" pitchFamily="18" charset="0"/>

</xml_diff>